<commit_message>
Add missing slide to the presentation
</commit_message>
<xml_diff>
--- a/ntk-production-ready-apis.pptx
+++ b/ntk-production-ready-apis.pptx
@@ -5,7 +5,7 @@
     <p:sldMasterId id="2147483660" r:id="rId1"/>
   </p:sldMasterIdLst>
   <p:notesMasterIdLst>
-    <p:notesMasterId r:id="rId23"/>
+    <p:notesMasterId r:id="rId25"/>
   </p:notesMasterIdLst>
   <p:sldIdLst>
     <p:sldId id="290" r:id="rId2"/>
@@ -18,17 +18,19 @@
     <p:sldId id="270" r:id="rId9"/>
     <p:sldId id="277" r:id="rId10"/>
     <p:sldId id="262" r:id="rId11"/>
-    <p:sldId id="265" r:id="rId12"/>
-    <p:sldId id="260" r:id="rId13"/>
-    <p:sldId id="293" r:id="rId14"/>
-    <p:sldId id="264" r:id="rId15"/>
-    <p:sldId id="257" r:id="rId16"/>
-    <p:sldId id="267" r:id="rId17"/>
-    <p:sldId id="278" r:id="rId18"/>
-    <p:sldId id="259" r:id="rId19"/>
-    <p:sldId id="266" r:id="rId20"/>
-    <p:sldId id="294" r:id="rId21"/>
-    <p:sldId id="283" r:id="rId22"/>
+    <p:sldId id="296" r:id="rId12"/>
+    <p:sldId id="265" r:id="rId13"/>
+    <p:sldId id="260" r:id="rId14"/>
+    <p:sldId id="293" r:id="rId15"/>
+    <p:sldId id="264" r:id="rId16"/>
+    <p:sldId id="257" r:id="rId17"/>
+    <p:sldId id="267" r:id="rId18"/>
+    <p:sldId id="295" r:id="rId19"/>
+    <p:sldId id="278" r:id="rId20"/>
+    <p:sldId id="259" r:id="rId21"/>
+    <p:sldId id="266" r:id="rId22"/>
+    <p:sldId id="294" r:id="rId23"/>
+    <p:sldId id="283" r:id="rId24"/>
   </p:sldIdLst>
   <p:sldSz cx="12192000" cy="6858000"/>
   <p:notesSz cx="6858000" cy="9144000"/>
@@ -217,7 +219,7 @@
           <a:p>
             <a:fld id="{E5E63FEF-96E9-495E-A04D-21B53DF0918C}" type="datetimeFigureOut">
               <a:rPr lang="en-US" smtClean="0"/>
-              <a:t>5/20/2019</a:t>
+              <a:t>5/23/2019</a:t>
             </a:fld>
             <a:endParaRPr lang="en-US"/>
           </a:p>
@@ -642,7 +644,7 @@
           <a:p>
             <a:fld id="{C8DA2B22-DD6B-46CA-A93F-FA5BD501CEA0}" type="slidenum">
               <a:rPr lang="en-US" smtClean="0"/>
-              <a:t>19</a:t>
+              <a:t>21</a:t>
             </a:fld>
             <a:endParaRPr lang="en-US"/>
           </a:p>
@@ -898,7 +900,7 @@
           <a:p>
             <a:fld id="{C8DA2B22-DD6B-46CA-A93F-FA5BD501CEA0}" type="slidenum">
               <a:rPr lang="en-US" smtClean="0"/>
-              <a:t>11</a:t>
+              <a:t>12</a:t>
             </a:fld>
             <a:endParaRPr lang="en-US"/>
           </a:p>
@@ -986,7 +988,7 @@
           <a:p>
             <a:fld id="{C8DA2B22-DD6B-46CA-A93F-FA5BD501CEA0}" type="slidenum">
               <a:rPr lang="en-US" smtClean="0"/>
-              <a:t>12</a:t>
+              <a:t>13</a:t>
             </a:fld>
             <a:endParaRPr lang="en-US"/>
           </a:p>
@@ -1074,7 +1076,7 @@
           <a:p>
             <a:fld id="{C8DA2B22-DD6B-46CA-A93F-FA5BD501CEA0}" type="slidenum">
               <a:rPr lang="en-US" smtClean="0"/>
-              <a:t>13</a:t>
+              <a:t>14</a:t>
             </a:fld>
             <a:endParaRPr lang="en-US"/>
           </a:p>
@@ -1162,7 +1164,7 @@
           <a:p>
             <a:fld id="{C8DA2B22-DD6B-46CA-A93F-FA5BD501CEA0}" type="slidenum">
               <a:rPr lang="en-US" smtClean="0"/>
-              <a:t>14</a:t>
+              <a:t>15</a:t>
             </a:fld>
             <a:endParaRPr lang="en-US"/>
           </a:p>
@@ -1250,7 +1252,7 @@
           <a:p>
             <a:fld id="{C8DA2B22-DD6B-46CA-A93F-FA5BD501CEA0}" type="slidenum">
               <a:rPr lang="en-US" smtClean="0"/>
-              <a:t>15</a:t>
+              <a:t>16</a:t>
             </a:fld>
             <a:endParaRPr lang="en-US"/>
           </a:p>
@@ -1338,7 +1340,7 @@
           <a:p>
             <a:fld id="{C8DA2B22-DD6B-46CA-A93F-FA5BD501CEA0}" type="slidenum">
               <a:rPr lang="en-US" smtClean="0"/>
-              <a:t>16</a:t>
+              <a:t>17</a:t>
             </a:fld>
             <a:endParaRPr lang="en-US"/>
           </a:p>
@@ -2920,7 +2922,7 @@
           <p:cNvPr id="4" name="Picture 3">
             <a:extLst>
               <a:ext uri="{FF2B5EF4-FFF2-40B4-BE49-F238E27FC236}">
-                <a16:creationId xmlns:a16="http://schemas.microsoft.com/office/drawing/2014/main" xmlns="" id="{BC6A4F80-F8BC-744B-A0E8-77CF40A5CA7E}"/>
+                <a16:creationId xmlns="" xmlns:a16="http://schemas.microsoft.com/office/drawing/2014/main" id="{BC6A4F80-F8BC-744B-A0E8-77CF40A5CA7E}"/>
               </a:ext>
             </a:extLst>
           </p:cNvPr>
@@ -7463,7 +7465,7 @@
           <p:cNvPr id="6" name="Rectangle 5">
             <a:extLst>
               <a:ext uri="{FF2B5EF4-FFF2-40B4-BE49-F238E27FC236}">
-                <a16:creationId xmlns:a16="http://schemas.microsoft.com/office/drawing/2014/main" xmlns="" id="{348D9D25-F702-204B-B5EA-8E36DF5CB68B}"/>
+                <a16:creationId xmlns="" xmlns:a16="http://schemas.microsoft.com/office/drawing/2014/main" id="{348D9D25-F702-204B-B5EA-8E36DF5CB68B}"/>
               </a:ext>
             </a:extLst>
           </p:cNvPr>
@@ -9645,7 +9647,7 @@
           <a:p>
             <a:fld id="{E5914902-FAA9-4B12-9BF5-1189198A1455}" type="datetimeFigureOut">
               <a:rPr lang="en-US" smtClean="0"/>
-              <a:t>5/20/2019</a:t>
+              <a:t>5/23/2019</a:t>
             </a:fld>
             <a:endParaRPr lang="en-US"/>
           </a:p>
@@ -9915,7 +9917,7 @@
           <a:p>
             <a:fld id="{E5914902-FAA9-4B12-9BF5-1189198A1455}" type="datetimeFigureOut">
               <a:rPr lang="en-US" smtClean="0"/>
-              <a:t>5/20/2019</a:t>
+              <a:t>5/23/2019</a:t>
             </a:fld>
             <a:endParaRPr lang="en-US"/>
           </a:p>
@@ -10109,7 +10111,7 @@
           <a:p>
             <a:fld id="{E5914902-FAA9-4B12-9BF5-1189198A1455}" type="datetimeFigureOut">
               <a:rPr lang="en-US" smtClean="0"/>
-              <a:t>5/20/2019</a:t>
+              <a:t>5/23/2019</a:t>
             </a:fld>
             <a:endParaRPr lang="en-US"/>
           </a:p>
@@ -10549,7 +10551,7 @@
           <p:cNvPr id="5" name="Oval 4">
             <a:extLst>
               <a:ext uri="{FF2B5EF4-FFF2-40B4-BE49-F238E27FC236}">
-                <a16:creationId xmlns:a16="http://schemas.microsoft.com/office/drawing/2014/main" xmlns="" id="{4DE9DEDA-3AD0-544D-8A6C-1B7AF0998DC5}"/>
+                <a16:creationId xmlns="" xmlns:a16="http://schemas.microsoft.com/office/drawing/2014/main" id="{4DE9DEDA-3AD0-544D-8A6C-1B7AF0998DC5}"/>
               </a:ext>
             </a:extLst>
           </p:cNvPr>
@@ -10611,7 +10613,7 @@
           <p:cNvPr id="1027" name="Text Placeholder 2">
             <a:extLst>
               <a:ext uri="{FF2B5EF4-FFF2-40B4-BE49-F238E27FC236}">
-                <a16:creationId xmlns:a16="http://schemas.microsoft.com/office/drawing/2014/main" xmlns="" id="{C8588613-02F5-784D-9EF6-286BAF77560F}"/>
+                <a16:creationId xmlns="" xmlns:a16="http://schemas.microsoft.com/office/drawing/2014/main" id="{C8588613-02F5-784D-9EF6-286BAF77560F}"/>
               </a:ext>
             </a:extLst>
           </p:cNvPr>
@@ -10704,7 +10706,7 @@
           <p:cNvPr id="1029" name="Title Placeholder 3">
             <a:extLst>
               <a:ext uri="{FF2B5EF4-FFF2-40B4-BE49-F238E27FC236}">
-                <a16:creationId xmlns:a16="http://schemas.microsoft.com/office/drawing/2014/main" xmlns="" id="{58B9BC8A-8CD8-A444-BB2E-BF2845D3A20A}"/>
+                <a16:creationId xmlns="" xmlns:a16="http://schemas.microsoft.com/office/drawing/2014/main" id="{58B9BC8A-8CD8-A444-BB2E-BF2845D3A20A}"/>
               </a:ext>
             </a:extLst>
           </p:cNvPr>
@@ -10769,7 +10771,7 @@
           <p:cNvPr id="1028" name="TextBox 9">
             <a:extLst>
               <a:ext uri="{FF2B5EF4-FFF2-40B4-BE49-F238E27FC236}">
-                <a16:creationId xmlns:a16="http://schemas.microsoft.com/office/drawing/2014/main" xmlns="" id="{CC833890-52F5-FB48-9362-E5ABE7FAAD96}"/>
+                <a16:creationId xmlns="" xmlns:a16="http://schemas.microsoft.com/office/drawing/2014/main" id="{CC833890-52F5-FB48-9362-E5ABE7FAAD96}"/>
               </a:ext>
             </a:extLst>
           </p:cNvPr>
@@ -10945,7 +10947,7 @@
           <p:cNvPr id="6" name="Picture 5">
             <a:extLst>
               <a:ext uri="{FF2B5EF4-FFF2-40B4-BE49-F238E27FC236}">
-                <a16:creationId xmlns:a16="http://schemas.microsoft.com/office/drawing/2014/main" xmlns="" id="{55212F41-D412-5A49-A68B-D14751B6C909}"/>
+                <a16:creationId xmlns="" xmlns:a16="http://schemas.microsoft.com/office/drawing/2014/main" id="{55212F41-D412-5A49-A68B-D14751B6C909}"/>
               </a:ext>
             </a:extLst>
           </p:cNvPr>
@@ -11562,8 +11564,8 @@
           <a:lstStyle/>
           <a:p>
             <a:r>
-              <a:rPr lang="en-US" dirty="0" smtClean="0"/>
-              <a:t>Security</a:t>
+              <a:rPr lang="sr-Latn-BA" dirty="0" smtClean="0"/>
+              <a:t>Best practices</a:t>
             </a:r>
             <a:endParaRPr lang="en-US" dirty="0"/>
           </a:p>
@@ -11591,9 +11593,21 @@
             </a:pPr>
             <a:r>
               <a:rPr lang="en-US" dirty="0">
+                <a:latin typeface="Consolas" panose="020B0609020204030204" pitchFamily="49" charset="0"/>
+              </a:rPr>
+              <a:t>IActionResult</a:t>
+            </a:r>
+            <a:r>
+              <a:rPr lang="en-US" dirty="0">
                 <a:latin typeface="Montserrat Hairline"/>
               </a:rPr>
-              <a:t>HTTPS</a:t>
+              <a:t>, </a:t>
+            </a:r>
+            <a:r>
+              <a:rPr lang="en-US" dirty="0">
+                <a:latin typeface="Consolas" panose="020B0609020204030204" pitchFamily="49" charset="0"/>
+              </a:rPr>
+              <a:t>ActionResult&lt;T&gt;</a:t>
             </a:r>
           </a:p>
           <a:p>
@@ -11606,20 +11620,7 @@
               <a:rPr lang="en-US" dirty="0">
                 <a:latin typeface="Montserrat Hairline"/>
               </a:rPr>
-              <a:t>OAuth 2.0</a:t>
-            </a:r>
-          </a:p>
-          <a:p>
-            <a:pPr marL="799307" lvl="1" indent="-342900">
-              <a:buBlip>
-                <a:blip r:embed="rId2"/>
-              </a:buBlip>
-            </a:pPr>
-            <a:r>
-              <a:rPr lang="en-US" dirty="0">
-                <a:latin typeface="Montserrat Hairline"/>
-              </a:rPr>
-              <a:t>Token based authentication</a:t>
+              <a:t>View Models</a:t>
             </a:r>
           </a:p>
           <a:p>
@@ -11632,38 +11633,8 @@
               <a:rPr lang="en-US" dirty="0">
                 <a:latin typeface="Montserrat Hairline"/>
               </a:rPr>
-              <a:t>Identity Server 4</a:t>
-            </a:r>
-          </a:p>
-          <a:p>
-            <a:pPr marL="799307" lvl="1" indent="-342900">
-              <a:buBlip>
-                <a:blip r:embed="rId2"/>
-              </a:buBlip>
-            </a:pPr>
-            <a:r>
-              <a:rPr lang="en-US" dirty="0">
-                <a:latin typeface="Montserrat Hairline"/>
-                <a:hlinkClick r:id="rId3"/>
-              </a:rPr>
-              <a:t>https://</a:t>
-            </a:r>
-            <a:r>
-              <a:rPr lang="en-US" dirty="0" smtClean="0">
-                <a:latin typeface="Montserrat Hairline"/>
-                <a:hlinkClick r:id="rId3"/>
-              </a:rPr>
-              <a:t>identityserver.io/</a:t>
-            </a:r>
-            <a:r>
-              <a:rPr lang="en-US" dirty="0" smtClean="0">
-                <a:latin typeface="Montserrat Hairline"/>
-              </a:rPr>
-              <a:t> </a:t>
-            </a:r>
-            <a:endParaRPr lang="en-US" dirty="0">
-              <a:latin typeface="Montserrat Hairline"/>
-            </a:endParaRPr>
+              <a:t>Model / input validation</a:t>
+            </a:r>
           </a:p>
           <a:p>
             <a:pPr marL="342900" indent="-342900">
@@ -11675,11 +11646,11 @@
               <a:rPr lang="en-US" dirty="0">
                 <a:latin typeface="Montserrat Hairline"/>
               </a:rPr>
-              <a:t>Third party</a:t>
-            </a:r>
-          </a:p>
-          <a:p>
-            <a:pPr marL="799307" lvl="1" indent="-342900">
+              <a:t>Exception handling</a:t>
+            </a:r>
+          </a:p>
+          <a:p>
+            <a:pPr marL="342900" indent="-342900">
               <a:buBlip>
                 <a:blip r:embed="rId2"/>
               </a:buBlip>
@@ -11688,80 +11659,24 @@
               <a:rPr lang="en-US" dirty="0">
                 <a:latin typeface="Montserrat Hairline"/>
               </a:rPr>
-              <a:t>Auth0 - </a:t>
-            </a:r>
-            <a:r>
-              <a:rPr lang="en-US" dirty="0">
-                <a:latin typeface="Montserrat Hairline"/>
-                <a:hlinkClick r:id="rId4"/>
-              </a:rPr>
-              <a:t>https://auth0.com</a:t>
-            </a:r>
-            <a:r>
-              <a:rPr lang="en-US" dirty="0" smtClean="0">
-                <a:latin typeface="Montserrat Hairline"/>
-                <a:hlinkClick r:id="rId4"/>
-              </a:rPr>
-              <a:t>/</a:t>
-            </a:r>
-            <a:r>
-              <a:rPr lang="en-US" dirty="0" smtClean="0">
-                <a:latin typeface="Montserrat Hairline"/>
-              </a:rPr>
-              <a:t>  </a:t>
-            </a:r>
-            <a:endParaRPr lang="en-US" dirty="0">
-              <a:latin typeface="Montserrat Hairline"/>
-            </a:endParaRPr>
-          </a:p>
-          <a:p>
-            <a:pPr marL="799307" lvl="1" indent="-342900">
+              <a:t>Logging</a:t>
+            </a:r>
+          </a:p>
+          <a:p>
+            <a:pPr marL="342900" indent="-342900">
               <a:buBlip>
                 <a:blip r:embed="rId2"/>
               </a:buBlip>
             </a:pPr>
             <a:r>
-              <a:rPr lang="en-US" dirty="0">
-                <a:latin typeface="Montserrat Hairline"/>
-              </a:rPr>
-              <a:t>Okta - </a:t>
-            </a:r>
-            <a:r>
-              <a:rPr lang="en-US" dirty="0">
-                <a:latin typeface="Montserrat Hairline"/>
-                <a:hlinkClick r:id="rId5"/>
-              </a:rPr>
-              <a:t>https://developer.okta.com</a:t>
-            </a:r>
-            <a:r>
-              <a:rPr lang="en-US" dirty="0" smtClean="0">
-                <a:latin typeface="Montserrat Hairline"/>
-                <a:hlinkClick r:id="rId5"/>
-              </a:rPr>
-              <a:t>/</a:t>
-            </a:r>
-            <a:r>
               <a:rPr lang="en-US" dirty="0" smtClean="0">
                 <a:latin typeface="Montserrat Hairline"/>
               </a:rPr>
-              <a:t>  </a:t>
+              <a:t>Paging</a:t>
             </a:r>
             <a:endParaRPr lang="en-US" dirty="0">
               <a:latin typeface="Montserrat Hairline"/>
             </a:endParaRPr>
-          </a:p>
-          <a:p>
-            <a:pPr marL="799307" lvl="1" indent="-342900">
-              <a:buBlip>
-                <a:blip r:embed="rId2"/>
-              </a:buBlip>
-            </a:pPr>
-            <a:r>
-              <a:rPr lang="en-US" dirty="0">
-                <a:latin typeface="Montserrat Hairline"/>
-              </a:rPr>
-              <a:t>…</a:t>
-            </a:r>
           </a:p>
         </p:txBody>
       </p:sp>
@@ -11819,7 +11734,7 @@
           <a:p>
             <a:r>
               <a:rPr lang="en-US" dirty="0" smtClean="0"/>
-              <a:t>Testing</a:t>
+              <a:t>Security</a:t>
             </a:r>
             <a:endParaRPr lang="en-US" dirty="0"/>
           </a:p>
@@ -11842,67 +11757,116 @@
           <a:p>
             <a:pPr marL="342900" indent="-342900">
               <a:buBlip>
-                <a:blip r:embed="rId3"/>
+                <a:blip r:embed="rId2"/>
               </a:buBlip>
             </a:pPr>
             <a:r>
               <a:rPr lang="en-US" dirty="0">
                 <a:latin typeface="Montserrat Hairline"/>
               </a:rPr>
-              <a:t>Unit testing &amp; Integration testing</a:t>
+              <a:t>HTTPS</a:t>
             </a:r>
           </a:p>
           <a:p>
             <a:pPr marL="342900" indent="-342900">
               <a:buBlip>
-                <a:blip r:embed="rId3"/>
+                <a:blip r:embed="rId2"/>
               </a:buBlip>
             </a:pPr>
             <a:r>
               <a:rPr lang="en-US" dirty="0">
                 <a:latin typeface="Montserrat Hairline"/>
               </a:rPr>
-              <a:t>Manual testing</a:t>
+              <a:t>OAuth 2.0</a:t>
             </a:r>
           </a:p>
           <a:p>
             <a:pPr marL="799307" lvl="1" indent="-342900">
               <a:buBlip>
-                <a:blip r:embed="rId3"/>
+                <a:blip r:embed="rId2"/>
               </a:buBlip>
             </a:pPr>
             <a:r>
               <a:rPr lang="en-US" dirty="0">
                 <a:latin typeface="Montserrat Hairline"/>
               </a:rPr>
-              <a:t>Tools (Postman, Fiddler…)</a:t>
+              <a:t>Token based authentication</a:t>
             </a:r>
           </a:p>
           <a:p>
             <a:pPr marL="342900" indent="-342900">
               <a:buBlip>
-                <a:blip r:embed="rId3"/>
+                <a:blip r:embed="rId2"/>
               </a:buBlip>
             </a:pPr>
             <a:r>
               <a:rPr lang="en-US" dirty="0">
                 <a:latin typeface="Montserrat Hairline"/>
               </a:rPr>
-              <a:t>Stress/load testing</a:t>
+              <a:t>Identity Server 4</a:t>
             </a:r>
           </a:p>
           <a:p>
             <a:pPr marL="799307" lvl="1" indent="-342900">
               <a:buBlip>
-                <a:blip r:embed="rId3"/>
+                <a:blip r:embed="rId2"/>
               </a:buBlip>
             </a:pPr>
+            <a:r>
+              <a:rPr lang="en-US" dirty="0">
+                <a:latin typeface="Montserrat Hairline"/>
+                <a:hlinkClick r:id="rId3"/>
+              </a:rPr>
+              <a:t>https://</a:t>
+            </a:r>
+            <a:r>
+              <a:rPr lang="en-US" dirty="0" smtClean="0">
+                <a:latin typeface="Montserrat Hairline"/>
+                <a:hlinkClick r:id="rId3"/>
+              </a:rPr>
+              <a:t>identityserver.io/</a:t>
+            </a:r>
+            <a:r>
+              <a:rPr lang="en-US" dirty="0" smtClean="0">
+                <a:latin typeface="Montserrat Hairline"/>
+              </a:rPr>
+              <a:t> </a:t>
+            </a:r>
+            <a:endParaRPr lang="en-US" dirty="0">
+              <a:latin typeface="Montserrat Hairline"/>
+            </a:endParaRPr>
+          </a:p>
+          <a:p>
+            <a:pPr marL="342900" indent="-342900">
+              <a:buBlip>
+                <a:blip r:embed="rId2"/>
+              </a:buBlip>
+            </a:pPr>
+            <a:r>
+              <a:rPr lang="en-US" dirty="0">
+                <a:latin typeface="Montserrat Hairline"/>
+              </a:rPr>
+              <a:t>Third party</a:t>
+            </a:r>
+          </a:p>
+          <a:p>
+            <a:pPr marL="799307" lvl="1" indent="-342900">
+              <a:buBlip>
+                <a:blip r:embed="rId2"/>
+              </a:buBlip>
+            </a:pPr>
+            <a:r>
+              <a:rPr lang="en-US" dirty="0">
+                <a:latin typeface="Montserrat Hairline"/>
+              </a:rPr>
+              <a:t>Auth0 - </a:t>
+            </a:r>
             <a:r>
               <a:rPr lang="en-US" dirty="0">
                 <a:latin typeface="Montserrat Hairline"/>
                 <a:hlinkClick r:id="rId4"/>
               </a:rPr>
-              <a:t>https://loader.io</a:t>
+              <a:t>https://auth0.com</a:t>
             </a:r>
             <a:r>
               <a:rPr lang="en-US" dirty="0" smtClean="0">
@@ -11915,7 +11879,7 @@
               <a:rPr lang="en-US" dirty="0" smtClean="0">
                 <a:latin typeface="Montserrat Hairline"/>
               </a:rPr>
-              <a:t> </a:t>
+              <a:t>  </a:t>
             </a:r>
             <a:endParaRPr lang="en-US" dirty="0">
               <a:latin typeface="Montserrat Hairline"/>
@@ -11924,15 +11888,21 @@
           <a:p>
             <a:pPr marL="799307" lvl="1" indent="-342900">
               <a:buBlip>
-                <a:blip r:embed="rId3"/>
+                <a:blip r:embed="rId2"/>
               </a:buBlip>
             </a:pPr>
+            <a:r>
+              <a:rPr lang="en-US" dirty="0">
+                <a:latin typeface="Montserrat Hairline"/>
+              </a:rPr>
+              <a:t>Okta - </a:t>
+            </a:r>
             <a:r>
               <a:rPr lang="en-US" dirty="0">
                 <a:latin typeface="Montserrat Hairline"/>
                 <a:hlinkClick r:id="rId5"/>
               </a:rPr>
-              <a:t>https://artillery.io</a:t>
+              <a:t>https://developer.okta.com</a:t>
             </a:r>
             <a:r>
               <a:rPr lang="en-US" dirty="0" smtClean="0">
@@ -11945,7 +11915,7 @@
               <a:rPr lang="en-US" dirty="0" smtClean="0">
                 <a:latin typeface="Montserrat Hairline"/>
               </a:rPr>
-              <a:t> </a:t>
+              <a:t>  </a:t>
             </a:r>
             <a:endParaRPr lang="en-US" dirty="0">
               <a:latin typeface="Montserrat Hairline"/>
@@ -11954,39 +11924,22 @@
           <a:p>
             <a:pPr marL="799307" lvl="1" indent="-342900">
               <a:buBlip>
-                <a:blip r:embed="rId3"/>
+                <a:blip r:embed="rId2"/>
               </a:buBlip>
             </a:pPr>
             <a:r>
               <a:rPr lang="en-US" dirty="0">
                 <a:latin typeface="Montserrat Hairline"/>
-                <a:hlinkClick r:id="rId6"/>
               </a:rPr>
-              <a:t>https://gatling.io</a:t>
-            </a:r>
-            <a:r>
-              <a:rPr lang="en-US" dirty="0" smtClean="0">
-                <a:latin typeface="Montserrat Hairline"/>
-                <a:hlinkClick r:id="rId6"/>
-              </a:rPr>
-              <a:t>/</a:t>
-            </a:r>
-            <a:r>
-              <a:rPr lang="en-US" dirty="0" smtClean="0">
-                <a:latin typeface="Montserrat Hairline"/>
-              </a:rPr>
-              <a:t> …</a:t>
-            </a:r>
-            <a:endParaRPr lang="en-US" dirty="0">
-              <a:latin typeface="Montserrat Hairline"/>
-            </a:endParaRPr>
+              <a:t>…</a:t>
+            </a:r>
           </a:p>
         </p:txBody>
       </p:sp>
     </p:spTree>
     <p:extLst>
       <p:ext uri="{BB962C8B-B14F-4D97-AF65-F5344CB8AC3E}">
-        <p14:creationId xmlns:p14="http://schemas.microsoft.com/office/powerpoint/2010/main" val="1322455923"/>
+        <p14:creationId xmlns:p14="http://schemas.microsoft.com/office/powerpoint/2010/main" val="99580361"/>
       </p:ext>
     </p:extLst>
   </p:cSld>
@@ -12037,6 +11990,224 @@
           <a:p>
             <a:r>
               <a:rPr lang="en-US" dirty="0" smtClean="0"/>
+              <a:t>Testing</a:t>
+            </a:r>
+            <a:endParaRPr lang="en-US" dirty="0"/>
+          </a:p>
+        </p:txBody>
+      </p:sp>
+      <p:sp>
+        <p:nvSpPr>
+          <p:cNvPr id="3" name="Content Placeholder 2"/>
+          <p:cNvSpPr>
+            <a:spLocks noGrp="1"/>
+          </p:cNvSpPr>
+          <p:nvPr>
+            <p:ph idx="1"/>
+          </p:nvPr>
+        </p:nvSpPr>
+        <p:spPr/>
+        <p:txBody>
+          <a:bodyPr/>
+          <a:lstStyle/>
+          <a:p>
+            <a:pPr marL="342900" indent="-342900">
+              <a:buBlip>
+                <a:blip r:embed="rId3"/>
+              </a:buBlip>
+            </a:pPr>
+            <a:r>
+              <a:rPr lang="en-US" dirty="0">
+                <a:latin typeface="Montserrat Hairline"/>
+              </a:rPr>
+              <a:t>Unit testing &amp; Integration testing</a:t>
+            </a:r>
+          </a:p>
+          <a:p>
+            <a:pPr marL="342900" indent="-342900">
+              <a:buBlip>
+                <a:blip r:embed="rId3"/>
+              </a:buBlip>
+            </a:pPr>
+            <a:r>
+              <a:rPr lang="en-US" dirty="0">
+                <a:latin typeface="Montserrat Hairline"/>
+              </a:rPr>
+              <a:t>Manual testing</a:t>
+            </a:r>
+          </a:p>
+          <a:p>
+            <a:pPr marL="799307" lvl="1" indent="-342900">
+              <a:buBlip>
+                <a:blip r:embed="rId3"/>
+              </a:buBlip>
+            </a:pPr>
+            <a:r>
+              <a:rPr lang="en-US" dirty="0">
+                <a:latin typeface="Montserrat Hairline"/>
+              </a:rPr>
+              <a:t>Tools (Postman, Fiddler…)</a:t>
+            </a:r>
+          </a:p>
+          <a:p>
+            <a:pPr marL="342900" indent="-342900">
+              <a:buBlip>
+                <a:blip r:embed="rId3"/>
+              </a:buBlip>
+            </a:pPr>
+            <a:r>
+              <a:rPr lang="en-US" dirty="0">
+                <a:latin typeface="Montserrat Hairline"/>
+              </a:rPr>
+              <a:t>Stress/load testing</a:t>
+            </a:r>
+          </a:p>
+          <a:p>
+            <a:pPr marL="799307" lvl="1" indent="-342900">
+              <a:buBlip>
+                <a:blip r:embed="rId3"/>
+              </a:buBlip>
+            </a:pPr>
+            <a:r>
+              <a:rPr lang="en-US" dirty="0">
+                <a:latin typeface="Montserrat Hairline"/>
+                <a:hlinkClick r:id="rId4"/>
+              </a:rPr>
+              <a:t>https://loader.io</a:t>
+            </a:r>
+            <a:r>
+              <a:rPr lang="en-US" dirty="0" smtClean="0">
+                <a:latin typeface="Montserrat Hairline"/>
+                <a:hlinkClick r:id="rId4"/>
+              </a:rPr>
+              <a:t>/</a:t>
+            </a:r>
+            <a:r>
+              <a:rPr lang="en-US" dirty="0" smtClean="0">
+                <a:latin typeface="Montserrat Hairline"/>
+              </a:rPr>
+              <a:t> </a:t>
+            </a:r>
+            <a:endParaRPr lang="en-US" dirty="0">
+              <a:latin typeface="Montserrat Hairline"/>
+            </a:endParaRPr>
+          </a:p>
+          <a:p>
+            <a:pPr marL="799307" lvl="1" indent="-342900">
+              <a:buBlip>
+                <a:blip r:embed="rId3"/>
+              </a:buBlip>
+            </a:pPr>
+            <a:r>
+              <a:rPr lang="en-US" dirty="0">
+                <a:latin typeface="Montserrat Hairline"/>
+                <a:hlinkClick r:id="rId5"/>
+              </a:rPr>
+              <a:t>https://artillery.io</a:t>
+            </a:r>
+            <a:r>
+              <a:rPr lang="en-US" dirty="0" smtClean="0">
+                <a:latin typeface="Montserrat Hairline"/>
+                <a:hlinkClick r:id="rId5"/>
+              </a:rPr>
+              <a:t>/</a:t>
+            </a:r>
+            <a:r>
+              <a:rPr lang="en-US" dirty="0" smtClean="0">
+                <a:latin typeface="Montserrat Hairline"/>
+              </a:rPr>
+              <a:t> </a:t>
+            </a:r>
+            <a:endParaRPr lang="en-US" dirty="0">
+              <a:latin typeface="Montserrat Hairline"/>
+            </a:endParaRPr>
+          </a:p>
+          <a:p>
+            <a:pPr marL="799307" lvl="1" indent="-342900">
+              <a:buBlip>
+                <a:blip r:embed="rId3"/>
+              </a:buBlip>
+            </a:pPr>
+            <a:r>
+              <a:rPr lang="en-US" dirty="0">
+                <a:latin typeface="Montserrat Hairline"/>
+                <a:hlinkClick r:id="rId6"/>
+              </a:rPr>
+              <a:t>https://gatling.io</a:t>
+            </a:r>
+            <a:r>
+              <a:rPr lang="en-US" dirty="0" smtClean="0">
+                <a:latin typeface="Montserrat Hairline"/>
+                <a:hlinkClick r:id="rId6"/>
+              </a:rPr>
+              <a:t>/</a:t>
+            </a:r>
+            <a:r>
+              <a:rPr lang="en-US" dirty="0" smtClean="0">
+                <a:latin typeface="Montserrat Hairline"/>
+              </a:rPr>
+              <a:t> …</a:t>
+            </a:r>
+            <a:endParaRPr lang="en-US" dirty="0">
+              <a:latin typeface="Montserrat Hairline"/>
+            </a:endParaRPr>
+          </a:p>
+        </p:txBody>
+      </p:sp>
+    </p:spTree>
+    <p:extLst>
+      <p:ext uri="{BB962C8B-B14F-4D97-AF65-F5344CB8AC3E}">
+        <p14:creationId xmlns:p14="http://schemas.microsoft.com/office/powerpoint/2010/main" val="1322455923"/>
+      </p:ext>
+    </p:extLst>
+  </p:cSld>
+  <p:clrMapOvr>
+    <a:masterClrMapping/>
+  </p:clrMapOvr>
+  <p:timing>
+    <p:tnLst>
+      <p:par>
+        <p:cTn id="1" dur="indefinite" restart="never" nodeType="tmRoot"/>
+      </p:par>
+    </p:tnLst>
+  </p:timing>
+</p:sld>
+</file>
+
+<file path=ppt/slides/slide13.xml><?xml version="1.0" encoding="utf-8"?>
+<p:sld xmlns:a="http://schemas.openxmlformats.org/drawingml/2006/main" xmlns:r="http://schemas.openxmlformats.org/officeDocument/2006/relationships" xmlns:p="http://schemas.openxmlformats.org/presentationml/2006/main">
+  <p:cSld>
+    <p:spTree>
+      <p:nvGrpSpPr>
+        <p:cNvPr id="1" name=""/>
+        <p:cNvGrpSpPr/>
+        <p:nvPr/>
+      </p:nvGrpSpPr>
+      <p:grpSpPr>
+        <a:xfrm>
+          <a:off x="0" y="0"/>
+          <a:ext cx="0" cy="0"/>
+          <a:chOff x="0" y="0"/>
+          <a:chExt cx="0" cy="0"/>
+        </a:xfrm>
+      </p:grpSpPr>
+      <p:sp>
+        <p:nvSpPr>
+          <p:cNvPr id="2" name="Title 1"/>
+          <p:cNvSpPr>
+            <a:spLocks noGrp="1"/>
+          </p:cNvSpPr>
+          <p:nvPr>
+            <p:ph type="title"/>
+          </p:nvPr>
+        </p:nvSpPr>
+        <p:spPr/>
+        <p:txBody>
+          <a:bodyPr/>
+          <a:lstStyle/>
+          <a:p>
+            <a:r>
+              <a:rPr lang="en-US" dirty="0" smtClean="0"/>
               <a:t>Documentation</a:t>
             </a:r>
             <a:endParaRPr lang="sr-Latn-BA" dirty="0"/>
@@ -12302,7 +12473,7 @@
 </p:sld>
 </file>
 
-<file path=ppt/slides/slide13.xml><?xml version="1.0" encoding="utf-8"?>
+<file path=ppt/slides/slide14.xml><?xml version="1.0" encoding="utf-8"?>
 <p:sld xmlns:a="http://schemas.openxmlformats.org/drawingml/2006/main" xmlns:r="http://schemas.openxmlformats.org/officeDocument/2006/relationships" xmlns:p="http://schemas.openxmlformats.org/presentationml/2006/main">
   <p:cSld>
     <p:spTree>
@@ -12439,13 +12610,8 @@
           <a:p>
             <a:r>
               <a:rPr lang="en-US" sz="1000" dirty="0"/>
-              <a:t>Image source: </a:t>
-            </a:r>
-            <a:r>
-              <a:rPr lang="en-US" sz="1000" dirty="0"/>
-              <a:t>https://www.percussion.com/blog/2015/March/unicorns-and-rainbows-wont-help-your-social-media-data-will</a:t>
-            </a:r>
-            <a:endParaRPr lang="en-US" sz="1000" dirty="0"/>
+              <a:t>Image source: https://www.percussion.com/blog/2015/March/unicorns-and-rainbows-wont-help-your-social-media-data-will</a:t>
+            </a:r>
           </a:p>
         </p:txBody>
       </p:sp>
@@ -12453,181 +12619,6 @@
     <p:extLst>
       <p:ext uri="{BB962C8B-B14F-4D97-AF65-F5344CB8AC3E}">
         <p14:creationId xmlns:p14="http://schemas.microsoft.com/office/powerpoint/2010/main" val="2645231331"/>
-      </p:ext>
-    </p:extLst>
-  </p:cSld>
-  <p:clrMapOvr>
-    <a:masterClrMapping/>
-  </p:clrMapOvr>
-  <p:timing>
-    <p:tnLst>
-      <p:par>
-        <p:cTn id="1" dur="indefinite" restart="never" nodeType="tmRoot"/>
-      </p:par>
-    </p:tnLst>
-  </p:timing>
-</p:sld>
-</file>
-
-<file path=ppt/slides/slide14.xml><?xml version="1.0" encoding="utf-8"?>
-<p:sld xmlns:a="http://schemas.openxmlformats.org/drawingml/2006/main" xmlns:r="http://schemas.openxmlformats.org/officeDocument/2006/relationships" xmlns:p="http://schemas.openxmlformats.org/presentationml/2006/main">
-  <p:cSld>
-    <p:spTree>
-      <p:nvGrpSpPr>
-        <p:cNvPr id="1" name=""/>
-        <p:cNvGrpSpPr/>
-        <p:nvPr/>
-      </p:nvGrpSpPr>
-      <p:grpSpPr>
-        <a:xfrm>
-          <a:off x="0" y="0"/>
-          <a:ext cx="0" cy="0"/>
-          <a:chOff x="0" y="0"/>
-          <a:chExt cx="0" cy="0"/>
-        </a:xfrm>
-      </p:grpSpPr>
-      <p:sp>
-        <p:nvSpPr>
-          <p:cNvPr id="2" name="Title 1"/>
-          <p:cNvSpPr>
-            <a:spLocks noGrp="1"/>
-          </p:cNvSpPr>
-          <p:nvPr>
-            <p:ph type="title"/>
-          </p:nvPr>
-        </p:nvSpPr>
-        <p:spPr/>
-        <p:txBody>
-          <a:bodyPr/>
-          <a:lstStyle/>
-          <a:p>
-            <a:r>
-              <a:rPr lang="en-US" dirty="0" smtClean="0"/>
-              <a:t>Usage limiting</a:t>
-            </a:r>
-            <a:endParaRPr lang="en-US" dirty="0"/>
-          </a:p>
-        </p:txBody>
-      </p:sp>
-      <p:sp>
-        <p:nvSpPr>
-          <p:cNvPr id="3" name="Content Placeholder 2"/>
-          <p:cNvSpPr>
-            <a:spLocks noGrp="1"/>
-          </p:cNvSpPr>
-          <p:nvPr>
-            <p:ph idx="1"/>
-          </p:nvPr>
-        </p:nvSpPr>
-        <p:spPr/>
-        <p:txBody>
-          <a:bodyPr>
-            <a:noAutofit/>
-          </a:bodyPr>
-          <a:lstStyle/>
-          <a:p>
-            <a:pPr indent="-342900">
-              <a:lnSpc>
-                <a:spcPct val="100000"/>
-              </a:lnSpc>
-              <a:buBlip>
-                <a:blip r:embed="rId3"/>
-              </a:buBlip>
-            </a:pPr>
-            <a:r>
-              <a:rPr lang="en-US" sz="2000" dirty="0">
-                <a:latin typeface="Montserrat Hairline"/>
-              </a:rPr>
-              <a:t>Limit per token</a:t>
-            </a:r>
-          </a:p>
-          <a:p>
-            <a:pPr lvl="1" indent="-342900">
-              <a:lnSpc>
-                <a:spcPct val="100000"/>
-              </a:lnSpc>
-              <a:buBlip>
-                <a:blip r:embed="rId3"/>
-              </a:buBlip>
-            </a:pPr>
-            <a:r>
-              <a:rPr lang="en-US" sz="1600" dirty="0">
-                <a:latin typeface="Montserrat Hairline"/>
-              </a:rPr>
-              <a:t>With middleware or action filter</a:t>
-            </a:r>
-          </a:p>
-          <a:p>
-            <a:pPr indent="-342900">
-              <a:lnSpc>
-                <a:spcPct val="100000"/>
-              </a:lnSpc>
-              <a:buBlip>
-                <a:blip r:embed="rId3"/>
-              </a:buBlip>
-            </a:pPr>
-            <a:r>
-              <a:rPr lang="en-US" sz="2000" dirty="0">
-                <a:latin typeface="Montserrat Hairline"/>
-                <a:hlinkClick r:id="rId4"/>
-              </a:rPr>
-              <a:t>https://</a:t>
-            </a:r>
-            <a:r>
-              <a:rPr lang="en-US" sz="2000" dirty="0" smtClean="0">
-                <a:latin typeface="Montserrat Hairline"/>
-                <a:hlinkClick r:id="rId4"/>
-              </a:rPr>
-              <a:t>github.com/stefanprodan/AspNetCoreRateLimit</a:t>
-            </a:r>
-            <a:r>
-              <a:rPr lang="en-US" sz="2000" dirty="0" smtClean="0">
-                <a:latin typeface="Montserrat Hairline"/>
-              </a:rPr>
-              <a:t> </a:t>
-            </a:r>
-            <a:endParaRPr lang="en-US" sz="2000" dirty="0">
-              <a:latin typeface="Montserrat Hairline"/>
-            </a:endParaRPr>
-          </a:p>
-          <a:p>
-            <a:pPr lvl="1" indent="-342900">
-              <a:lnSpc>
-                <a:spcPct val="100000"/>
-              </a:lnSpc>
-              <a:buBlip>
-                <a:blip r:embed="rId3"/>
-              </a:buBlip>
-            </a:pPr>
-            <a:r>
-              <a:rPr lang="en-US" sz="1600" dirty="0">
-                <a:latin typeface="Montserrat Hairline"/>
-              </a:rPr>
-              <a:t>Limit per Client IP</a:t>
-            </a:r>
-          </a:p>
-          <a:p>
-            <a:pPr lvl="1" indent="-342900">
-              <a:lnSpc>
-                <a:spcPct val="100000"/>
-              </a:lnSpc>
-              <a:buBlip>
-                <a:blip r:embed="rId3"/>
-              </a:buBlip>
-            </a:pPr>
-            <a:r>
-              <a:rPr lang="en-US" sz="1600" dirty="0">
-                <a:latin typeface="Montserrat Hairline"/>
-              </a:rPr>
-              <a:t>Limit per Client ID header</a:t>
-            </a:r>
-          </a:p>
-        </p:txBody>
-      </p:sp>
-    </p:spTree>
-    <p:extLst>
-      <p:ext uri="{BB962C8B-B14F-4D97-AF65-F5344CB8AC3E}">
-        <p14:creationId xmlns:p14="http://schemas.microsoft.com/office/powerpoint/2010/main" val="3466708283"/>
       </p:ext>
     </p:extLst>
   </p:cSld>
@@ -12678,7 +12669,7 @@
           <a:p>
             <a:r>
               <a:rPr lang="en-US" dirty="0" smtClean="0"/>
-              <a:t>Versioning</a:t>
+              <a:t>Usage limiting</a:t>
             </a:r>
             <a:endParaRPr lang="en-US" dirty="0"/>
           </a:p>
@@ -12696,205 +12687,105 @@
         </p:nvSpPr>
         <p:spPr/>
         <p:txBody>
-          <a:bodyPr/>
+          <a:bodyPr>
+            <a:noAutofit/>
+          </a:bodyPr>
           <a:lstStyle/>
           <a:p>
             <a:pPr indent="-342900">
+              <a:lnSpc>
+                <a:spcPct val="100000"/>
+              </a:lnSpc>
               <a:buBlip>
                 <a:blip r:embed="rId3"/>
               </a:buBlip>
             </a:pPr>
             <a:r>
-              <a:rPr lang="en-US" dirty="0"/>
-              <a:t>URL</a:t>
-            </a:r>
-          </a:p>
-          <a:p>
-            <a:pPr lvl="2" indent="-342900">
+              <a:rPr lang="en-US" sz="2000" dirty="0">
+                <a:latin typeface="Montserrat Hairline"/>
+              </a:rPr>
+              <a:t>Limit per token</a:t>
+            </a:r>
+          </a:p>
+          <a:p>
+            <a:pPr lvl="1" indent="-342900">
+              <a:lnSpc>
+                <a:spcPct val="100000"/>
+              </a:lnSpc>
               <a:buBlip>
                 <a:blip r:embed="rId3"/>
               </a:buBlip>
             </a:pPr>
             <a:r>
-              <a:rPr lang="en-US" dirty="0">
-                <a:latin typeface="Consolas" panose="020B0609020204030204" pitchFamily="49" charset="0"/>
+              <a:rPr lang="en-US" sz="1600" dirty="0">
+                <a:latin typeface="Montserrat Hairline"/>
               </a:rPr>
-              <a:t>/</a:t>
-            </a:r>
-            <a:r>
-              <a:rPr lang="en-US" dirty="0" err="1">
-                <a:latin typeface="Consolas" panose="020B0609020204030204" pitchFamily="49" charset="0"/>
-              </a:rPr>
-              <a:t>api</a:t>
-            </a:r>
-            <a:r>
-              <a:rPr lang="en-US" dirty="0">
-                <a:latin typeface="Consolas" panose="020B0609020204030204" pitchFamily="49" charset="0"/>
-              </a:rPr>
-              <a:t>/v2/games/</a:t>
+              <a:t>With middleware or action filter</a:t>
             </a:r>
           </a:p>
           <a:p>
             <a:pPr indent="-342900">
+              <a:lnSpc>
+                <a:spcPct val="100000"/>
+              </a:lnSpc>
               <a:buBlip>
                 <a:blip r:embed="rId3"/>
               </a:buBlip>
             </a:pPr>
             <a:r>
-              <a:rPr lang="en-US" dirty="0"/>
-              <a:t>Query string</a:t>
-            </a:r>
-          </a:p>
-          <a:p>
-            <a:pPr lvl="2" indent="-342900">
+              <a:rPr lang="en-US" sz="2000" dirty="0">
+                <a:latin typeface="Montserrat Hairline"/>
+                <a:hlinkClick r:id="rId4"/>
+              </a:rPr>
+              <a:t>https://</a:t>
+            </a:r>
+            <a:r>
+              <a:rPr lang="en-US" sz="2000" dirty="0" smtClean="0">
+                <a:latin typeface="Montserrat Hairline"/>
+                <a:hlinkClick r:id="rId4"/>
+              </a:rPr>
+              <a:t>github.com/stefanprodan/AspNetCoreRateLimit</a:t>
+            </a:r>
+            <a:r>
+              <a:rPr lang="en-US" sz="2000" dirty="0" smtClean="0">
+                <a:latin typeface="Montserrat Hairline"/>
+              </a:rPr>
+              <a:t> </a:t>
+            </a:r>
+            <a:endParaRPr lang="en-US" sz="2000" dirty="0">
+              <a:latin typeface="Montserrat Hairline"/>
+            </a:endParaRPr>
+          </a:p>
+          <a:p>
+            <a:pPr lvl="1" indent="-342900">
+              <a:lnSpc>
+                <a:spcPct val="100000"/>
+              </a:lnSpc>
               <a:buBlip>
                 <a:blip r:embed="rId3"/>
               </a:buBlip>
             </a:pPr>
             <a:r>
-              <a:rPr lang="en-US" dirty="0">
-                <a:latin typeface="Consolas" panose="020B0609020204030204" pitchFamily="49" charset="0"/>
+              <a:rPr lang="en-US" sz="1600" dirty="0">
+                <a:latin typeface="Montserrat Hairline"/>
               </a:rPr>
-              <a:t>/</a:t>
-            </a:r>
-            <a:r>
-              <a:rPr lang="en-US" dirty="0" err="1">
-                <a:latin typeface="Consolas" panose="020B0609020204030204" pitchFamily="49" charset="0"/>
-              </a:rPr>
-              <a:t>api</a:t>
-            </a:r>
-            <a:r>
-              <a:rPr lang="en-US" dirty="0">
-                <a:latin typeface="Consolas" panose="020B0609020204030204" pitchFamily="49" charset="0"/>
-              </a:rPr>
-              <a:t>/</a:t>
-            </a:r>
-            <a:r>
-              <a:rPr lang="en-US" dirty="0" err="1">
-                <a:latin typeface="Consolas" panose="020B0609020204030204" pitchFamily="49" charset="0"/>
-              </a:rPr>
-              <a:t>games?api-version</a:t>
-            </a:r>
-            <a:r>
-              <a:rPr lang="en-US" dirty="0">
-                <a:latin typeface="Consolas" panose="020B0609020204030204" pitchFamily="49" charset="0"/>
-              </a:rPr>
-              <a:t>=2</a:t>
-            </a:r>
-          </a:p>
-          <a:p>
-            <a:pPr indent="-342900">
+              <a:t>Limit per Client IP</a:t>
+            </a:r>
+          </a:p>
+          <a:p>
+            <a:pPr lvl="1" indent="-342900">
+              <a:lnSpc>
+                <a:spcPct val="100000"/>
+              </a:lnSpc>
               <a:buBlip>
                 <a:blip r:embed="rId3"/>
               </a:buBlip>
             </a:pPr>
             <a:r>
-              <a:rPr lang="en-US" dirty="0"/>
-              <a:t>Custom request header</a:t>
-            </a:r>
-          </a:p>
-          <a:p>
-            <a:pPr lvl="2" indent="-342900">
-              <a:buBlip>
-                <a:blip r:embed="rId3"/>
-              </a:buBlip>
-            </a:pPr>
-            <a:r>
-              <a:rPr lang="en-US" dirty="0" err="1">
-                <a:latin typeface="Consolas" panose="020B0609020204030204" pitchFamily="49" charset="0"/>
+              <a:rPr lang="en-US" sz="1600" dirty="0">
+                <a:latin typeface="Montserrat Hairline"/>
               </a:rPr>
-              <a:t>api</a:t>
-            </a:r>
-            <a:r>
-              <a:rPr lang="en-US" dirty="0">
-                <a:latin typeface="Consolas" panose="020B0609020204030204" pitchFamily="49" charset="0"/>
-              </a:rPr>
-              <a:t>-version: 2</a:t>
-            </a:r>
-          </a:p>
-          <a:p>
-            <a:pPr indent="-342900">
-              <a:buBlip>
-                <a:blip r:embed="rId3"/>
-              </a:buBlip>
-            </a:pPr>
-            <a:r>
-              <a:rPr lang="en-US" dirty="0"/>
-              <a:t>Accept header</a:t>
-            </a:r>
-          </a:p>
-          <a:p>
-            <a:pPr lvl="2" indent="-342900">
-              <a:buBlip>
-                <a:blip r:embed="rId3"/>
-              </a:buBlip>
-            </a:pPr>
-            <a:r>
-              <a:rPr lang="en-US" dirty="0">
-                <a:latin typeface="Consolas" panose="020B0609020204030204" pitchFamily="49" charset="0"/>
-              </a:rPr>
-              <a:t>Accept: application/</a:t>
-            </a:r>
-            <a:r>
-              <a:rPr lang="en-US" dirty="0" err="1">
-                <a:latin typeface="Consolas" panose="020B0609020204030204" pitchFamily="49" charset="0"/>
-              </a:rPr>
-              <a:t>json;v</a:t>
-            </a:r>
-            <a:r>
-              <a:rPr lang="en-US" dirty="0">
-                <a:latin typeface="Consolas" panose="020B0609020204030204" pitchFamily="49" charset="0"/>
-              </a:rPr>
-              <a:t>=2</a:t>
-            </a:r>
-          </a:p>
-          <a:p>
-            <a:pPr indent="-342900">
-              <a:buBlip>
-                <a:blip r:embed="rId3"/>
-              </a:buBlip>
-            </a:pPr>
-            <a:r>
-              <a:rPr lang="en-US" dirty="0" err="1">
-                <a:latin typeface="Consolas" panose="020B0609020204030204" pitchFamily="49" charset="0"/>
-              </a:rPr>
-              <a:t>Microsoft.AspNetCore.Mvc.Versioning</a:t>
-            </a:r>
-            <a:endParaRPr lang="en-US" dirty="0">
-              <a:latin typeface="Consolas" panose="020B0609020204030204" pitchFamily="49" charset="0"/>
-            </a:endParaRPr>
-          </a:p>
-          <a:p>
-            <a:pPr lvl="2" indent="-342900">
-              <a:buBlip>
-                <a:blip r:embed="rId3"/>
-              </a:buBlip>
-            </a:pPr>
-            <a:r>
-              <a:rPr lang="en-US" dirty="0"/>
-              <a:t>Supports all types, query string by default (</a:t>
-            </a:r>
-            <a:r>
-              <a:rPr lang="en-US" dirty="0">
-                <a:latin typeface="Consolas" panose="020B0609020204030204" pitchFamily="49" charset="0"/>
-              </a:rPr>
-              <a:t>?</a:t>
-            </a:r>
-            <a:r>
-              <a:rPr lang="en-US" dirty="0" err="1">
-                <a:latin typeface="Consolas" panose="020B0609020204030204" pitchFamily="49" charset="0"/>
-              </a:rPr>
-              <a:t>api</a:t>
-            </a:r>
-            <a:r>
-              <a:rPr lang="en-US" dirty="0">
-                <a:latin typeface="Consolas" panose="020B0609020204030204" pitchFamily="49" charset="0"/>
-              </a:rPr>
-              <a:t>-version=2</a:t>
-            </a:r>
-            <a:r>
-              <a:rPr lang="en-US" dirty="0"/>
-              <a:t>)</a:t>
+              <a:t>Limit per Client ID header</a:t>
             </a:r>
           </a:p>
         </p:txBody>
@@ -12902,7 +12793,7 @@
     </p:spTree>
     <p:extLst>
       <p:ext uri="{BB962C8B-B14F-4D97-AF65-F5344CB8AC3E}">
-        <p14:creationId xmlns:p14="http://schemas.microsoft.com/office/powerpoint/2010/main" val="1562436700"/>
+        <p14:creationId xmlns:p14="http://schemas.microsoft.com/office/powerpoint/2010/main" val="3466708283"/>
       </p:ext>
     </p:extLst>
   </p:cSld>
@@ -12953,7 +12844,7 @@
           <a:p>
             <a:r>
               <a:rPr lang="en-US" dirty="0" smtClean="0"/>
-              <a:t>Monitoring</a:t>
+              <a:t>Versioning</a:t>
             </a:r>
             <a:endParaRPr lang="en-US" dirty="0"/>
           </a:p>
@@ -12971,214 +12862,205 @@
         </p:nvSpPr>
         <p:spPr/>
         <p:txBody>
-          <a:bodyPr>
-            <a:noAutofit/>
-          </a:bodyPr>
+          <a:bodyPr/>
           <a:lstStyle/>
           <a:p>
             <a:pPr indent="-342900">
-              <a:lnSpc>
-                <a:spcPct val="100000"/>
-              </a:lnSpc>
               <a:buBlip>
                 <a:blip r:embed="rId3"/>
               </a:buBlip>
             </a:pPr>
             <a:r>
-              <a:rPr lang="en-US" sz="2000" dirty="0"/>
-              <a:t>Simple logging – errors, logs</a:t>
-            </a:r>
-          </a:p>
-          <a:p>
-            <a:pPr indent="-342900">
-              <a:lnSpc>
-                <a:spcPct val="100000"/>
-              </a:lnSpc>
+              <a:rPr lang="en-US" dirty="0"/>
+              <a:t>URL</a:t>
+            </a:r>
+          </a:p>
+          <a:p>
+            <a:pPr lvl="2" indent="-342900">
               <a:buBlip>
                 <a:blip r:embed="rId3"/>
               </a:buBlip>
             </a:pPr>
             <a:r>
-              <a:rPr lang="en-US" sz="2000" dirty="0"/>
-              <a:t>Performance tracking</a:t>
+              <a:rPr lang="en-US" dirty="0">
+                <a:latin typeface="Consolas" panose="020B0609020204030204" pitchFamily="49" charset="0"/>
+              </a:rPr>
+              <a:t>/</a:t>
+            </a:r>
+            <a:r>
+              <a:rPr lang="en-US" dirty="0" err="1">
+                <a:latin typeface="Consolas" panose="020B0609020204030204" pitchFamily="49" charset="0"/>
+              </a:rPr>
+              <a:t>api</a:t>
+            </a:r>
+            <a:r>
+              <a:rPr lang="en-US" dirty="0">
+                <a:latin typeface="Consolas" panose="020B0609020204030204" pitchFamily="49" charset="0"/>
+              </a:rPr>
+              <a:t>/v2/games/</a:t>
             </a:r>
           </a:p>
           <a:p>
             <a:pPr indent="-342900">
-              <a:lnSpc>
-                <a:spcPct val="100000"/>
-              </a:lnSpc>
               <a:buBlip>
                 <a:blip r:embed="rId3"/>
               </a:buBlip>
             </a:pPr>
             <a:r>
-              <a:rPr lang="en-US" sz="2000" dirty="0"/>
-              <a:t>Usage tracking</a:t>
-            </a:r>
-          </a:p>
-          <a:p>
-            <a:pPr indent="-342900">
-              <a:lnSpc>
-                <a:spcPct val="100000"/>
-              </a:lnSpc>
+              <a:rPr lang="en-US" dirty="0"/>
+              <a:t>Query string</a:t>
+            </a:r>
+          </a:p>
+          <a:p>
+            <a:pPr lvl="2" indent="-342900">
               <a:buBlip>
                 <a:blip r:embed="rId3"/>
               </a:buBlip>
             </a:pPr>
             <a:r>
-              <a:rPr lang="en-US" sz="2000" dirty="0"/>
-              <a:t>Azure – Azure Monitor, Application Insights, Log Analytics …</a:t>
+              <a:rPr lang="en-US" dirty="0">
+                <a:latin typeface="Consolas" panose="020B0609020204030204" pitchFamily="49" charset="0"/>
+              </a:rPr>
+              <a:t>/</a:t>
+            </a:r>
+            <a:r>
+              <a:rPr lang="en-US" dirty="0" err="1">
+                <a:latin typeface="Consolas" panose="020B0609020204030204" pitchFamily="49" charset="0"/>
+              </a:rPr>
+              <a:t>api</a:t>
+            </a:r>
+            <a:r>
+              <a:rPr lang="en-US" dirty="0">
+                <a:latin typeface="Consolas" panose="020B0609020204030204" pitchFamily="49" charset="0"/>
+              </a:rPr>
+              <a:t>/</a:t>
+            </a:r>
+            <a:r>
+              <a:rPr lang="en-US" dirty="0" err="1">
+                <a:latin typeface="Consolas" panose="020B0609020204030204" pitchFamily="49" charset="0"/>
+              </a:rPr>
+              <a:t>games?api-version</a:t>
+            </a:r>
+            <a:r>
+              <a:rPr lang="en-US" dirty="0">
+                <a:latin typeface="Consolas" panose="020B0609020204030204" pitchFamily="49" charset="0"/>
+              </a:rPr>
+              <a:t>=2</a:t>
             </a:r>
           </a:p>
           <a:p>
             <a:pPr indent="-342900">
-              <a:lnSpc>
-                <a:spcPct val="100000"/>
-              </a:lnSpc>
               <a:buBlip>
                 <a:blip r:embed="rId3"/>
               </a:buBlip>
             </a:pPr>
             <a:r>
-              <a:rPr lang="en-US" sz="2000" dirty="0"/>
-              <a:t>ASP.NET Core Health Checks</a:t>
-            </a:r>
-          </a:p>
-          <a:p>
-            <a:pPr indent="-342900">
-              <a:lnSpc>
-                <a:spcPct val="100000"/>
-              </a:lnSpc>
+              <a:rPr lang="en-US" dirty="0"/>
+              <a:t>Custom request header</a:t>
+            </a:r>
+          </a:p>
+          <a:p>
+            <a:pPr lvl="2" indent="-342900">
               <a:buBlip>
                 <a:blip r:embed="rId3"/>
               </a:buBlip>
             </a:pPr>
             <a:r>
-              <a:rPr lang="en-US" sz="2000" dirty="0"/>
-              <a:t>Third-party monitoring services</a:t>
-            </a:r>
-          </a:p>
-          <a:p>
-            <a:pPr lvl="1" indent="-342900">
-              <a:lnSpc>
-                <a:spcPct val="100000"/>
-              </a:lnSpc>
+              <a:rPr lang="en-US" dirty="0" err="1">
+                <a:latin typeface="Consolas" panose="020B0609020204030204" pitchFamily="49" charset="0"/>
+              </a:rPr>
+              <a:t>api</a:t>
+            </a:r>
+            <a:r>
+              <a:rPr lang="en-US" dirty="0">
+                <a:latin typeface="Consolas" panose="020B0609020204030204" pitchFamily="49" charset="0"/>
+              </a:rPr>
+              <a:t>-version: 2</a:t>
+            </a:r>
+          </a:p>
+          <a:p>
+            <a:pPr indent="-342900">
               <a:buBlip>
                 <a:blip r:embed="rId3"/>
               </a:buBlip>
             </a:pPr>
             <a:r>
-              <a:rPr lang="en-US" sz="1600" dirty="0">
-                <a:hlinkClick r:id="rId4"/>
-              </a:rPr>
-              <a:t>https://newrelic.com</a:t>
-            </a:r>
-            <a:r>
-              <a:rPr lang="en-US" sz="1600" dirty="0" smtClean="0">
-                <a:hlinkClick r:id="rId4"/>
-              </a:rPr>
-              <a:t>/</a:t>
-            </a:r>
-            <a:r>
-              <a:rPr lang="en-US" sz="1600" dirty="0" smtClean="0"/>
-              <a:t> </a:t>
-            </a:r>
-            <a:endParaRPr lang="en-US" sz="1600" dirty="0"/>
-          </a:p>
-          <a:p>
-            <a:pPr lvl="1" indent="-342900">
-              <a:lnSpc>
-                <a:spcPct val="100000"/>
-              </a:lnSpc>
+              <a:rPr lang="en-US" dirty="0"/>
+              <a:t>Accept header</a:t>
+            </a:r>
+          </a:p>
+          <a:p>
+            <a:pPr lvl="2" indent="-342900">
               <a:buBlip>
                 <a:blip r:embed="rId3"/>
               </a:buBlip>
             </a:pPr>
             <a:r>
-              <a:rPr lang="en-US" sz="1600" dirty="0">
-                <a:hlinkClick r:id="rId5"/>
+              <a:rPr lang="en-US" dirty="0">
+                <a:latin typeface="Consolas" panose="020B0609020204030204" pitchFamily="49" charset="0"/>
               </a:rPr>
-              <a:t>https://stackify.com</a:t>
-            </a:r>
-            <a:r>
-              <a:rPr lang="en-US" sz="1600" dirty="0" smtClean="0">
-                <a:hlinkClick r:id="rId5"/>
+              <a:t>Accept: application/</a:t>
+            </a:r>
+            <a:r>
+              <a:rPr lang="en-US" dirty="0" err="1">
+                <a:latin typeface="Consolas" panose="020B0609020204030204" pitchFamily="49" charset="0"/>
               </a:rPr>
-              <a:t>/</a:t>
-            </a:r>
-            <a:r>
-              <a:rPr lang="en-US" sz="1600" dirty="0" smtClean="0"/>
-              <a:t> </a:t>
-            </a:r>
-            <a:endParaRPr lang="en-US" sz="1600" dirty="0"/>
-          </a:p>
-          <a:p>
-            <a:pPr lvl="1" indent="-342900">
-              <a:lnSpc>
-                <a:spcPct val="100000"/>
-              </a:lnSpc>
+              <a:t>json;v</a:t>
+            </a:r>
+            <a:r>
+              <a:rPr lang="en-US" dirty="0">
+                <a:latin typeface="Consolas" panose="020B0609020204030204" pitchFamily="49" charset="0"/>
+              </a:rPr>
+              <a:t>=2</a:t>
+            </a:r>
+          </a:p>
+          <a:p>
+            <a:pPr indent="-342900">
               <a:buBlip>
                 <a:blip r:embed="rId3"/>
               </a:buBlip>
             </a:pPr>
             <a:r>
-              <a:rPr lang="en-US" sz="1600" dirty="0">
-                <a:hlinkClick r:id="rId6"/>
+              <a:rPr lang="en-US" dirty="0" err="1">
+                <a:latin typeface="Consolas" panose="020B0609020204030204" pitchFamily="49" charset="0"/>
               </a:rPr>
-              <a:t>https://www.monitis.com</a:t>
-            </a:r>
-            <a:r>
-              <a:rPr lang="en-US" sz="1600" dirty="0" smtClean="0">
-                <a:hlinkClick r:id="rId6"/>
-              </a:rPr>
-              <a:t>/</a:t>
-            </a:r>
-            <a:r>
-              <a:rPr lang="en-US" sz="1600" dirty="0" smtClean="0"/>
-              <a:t> </a:t>
-            </a:r>
-            <a:endParaRPr lang="en-US" sz="1600" dirty="0"/>
-          </a:p>
-          <a:p>
-            <a:pPr lvl="1" indent="-342900">
-              <a:lnSpc>
-                <a:spcPct val="100000"/>
-              </a:lnSpc>
+              <a:t>Microsoft.AspNetCore.Mvc.Versioning</a:t>
+            </a:r>
+            <a:endParaRPr lang="en-US" dirty="0">
+              <a:latin typeface="Consolas" panose="020B0609020204030204" pitchFamily="49" charset="0"/>
+            </a:endParaRPr>
+          </a:p>
+          <a:p>
+            <a:pPr lvl="2" indent="-342900">
               <a:buBlip>
                 <a:blip r:embed="rId3"/>
               </a:buBlip>
             </a:pPr>
             <a:r>
-              <a:rPr lang="en-US" sz="1600" dirty="0">
-                <a:hlinkClick r:id="rId7"/>
+              <a:rPr lang="en-US" dirty="0"/>
+              <a:t>Supports all types, query string by default (</a:t>
+            </a:r>
+            <a:r>
+              <a:rPr lang="en-US" dirty="0">
+                <a:latin typeface="Consolas" panose="020B0609020204030204" pitchFamily="49" charset="0"/>
               </a:rPr>
-              <a:t>https://www.runscope.com</a:t>
-            </a:r>
-            <a:r>
-              <a:rPr lang="en-US" sz="1600" dirty="0" smtClean="0">
-                <a:hlinkClick r:id="rId7"/>
+              <a:t>?</a:t>
+            </a:r>
+            <a:r>
+              <a:rPr lang="en-US" dirty="0" err="1">
+                <a:latin typeface="Consolas" panose="020B0609020204030204" pitchFamily="49" charset="0"/>
               </a:rPr>
-              <a:t>/</a:t>
-            </a:r>
-            <a:r>
-              <a:rPr lang="en-US" sz="1600" dirty="0" smtClean="0"/>
-              <a:t> </a:t>
-            </a:r>
-            <a:endParaRPr lang="en-US" sz="1600" dirty="0"/>
-          </a:p>
-          <a:p>
-            <a:pPr lvl="1" indent="-342900">
-              <a:lnSpc>
-                <a:spcPct val="100000"/>
-              </a:lnSpc>
-              <a:buBlip>
-                <a:blip r:embed="rId3"/>
-              </a:buBlip>
-            </a:pPr>
-            <a:r>
-              <a:rPr lang="en-US" sz="1600" dirty="0"/>
-              <a:t>…</a:t>
+              <a:t>api</a:t>
+            </a:r>
+            <a:r>
+              <a:rPr lang="en-US" dirty="0">
+                <a:latin typeface="Consolas" panose="020B0609020204030204" pitchFamily="49" charset="0"/>
+              </a:rPr>
+              <a:t>-version=2</a:t>
+            </a:r>
+            <a:r>
+              <a:rPr lang="en-US" dirty="0"/>
+              <a:t>)</a:t>
             </a:r>
           </a:p>
         </p:txBody>
@@ -13186,7 +13068,7 @@
     </p:spTree>
     <p:extLst>
       <p:ext uri="{BB962C8B-B14F-4D97-AF65-F5344CB8AC3E}">
-        <p14:creationId xmlns:p14="http://schemas.microsoft.com/office/powerpoint/2010/main" val="903040751"/>
+        <p14:creationId xmlns:p14="http://schemas.microsoft.com/office/powerpoint/2010/main" val="1562436700"/>
       </p:ext>
     </p:extLst>
   </p:cSld>
@@ -13222,7 +13104,7 @@
       </p:grpSpPr>
       <p:sp>
         <p:nvSpPr>
-          <p:cNvPr id="4" name="Title 3"/>
+          <p:cNvPr id="2" name="Title 1"/>
           <p:cNvSpPr>
             <a:spLocks noGrp="1"/>
           </p:cNvSpPr>
@@ -13237,7 +13119,7 @@
           <a:p>
             <a:r>
               <a:rPr lang="en-US" dirty="0" smtClean="0"/>
-              <a:t>Closing up</a:t>
+              <a:t>Monitoring</a:t>
             </a:r>
             <a:endParaRPr lang="en-US" dirty="0"/>
           </a:p>
@@ -13245,27 +13127,232 @@
       </p:sp>
       <p:sp>
         <p:nvSpPr>
-          <p:cNvPr id="5" name="Text Placeholder 4"/>
-          <p:cNvSpPr>
-            <a:spLocks noGrp="1"/>
-          </p:cNvSpPr>
-          <p:nvPr>
-            <p:ph type="body" idx="1"/>
+          <p:cNvPr id="3" name="Content Placeholder 2"/>
+          <p:cNvSpPr>
+            <a:spLocks noGrp="1"/>
+          </p:cNvSpPr>
+          <p:nvPr>
+            <p:ph idx="1"/>
           </p:nvPr>
         </p:nvSpPr>
         <p:spPr/>
         <p:txBody>
-          <a:bodyPr/>
+          <a:bodyPr>
+            <a:noAutofit/>
+          </a:bodyPr>
           <a:lstStyle/>
           <a:p>
-            <a:endParaRPr lang="en-US"/>
+            <a:pPr indent="-342900">
+              <a:lnSpc>
+                <a:spcPct val="100000"/>
+              </a:lnSpc>
+              <a:buBlip>
+                <a:blip r:embed="rId3"/>
+              </a:buBlip>
+            </a:pPr>
+            <a:r>
+              <a:rPr lang="en-US" sz="2000" dirty="0"/>
+              <a:t>Simple logging – errors, logs</a:t>
+            </a:r>
+          </a:p>
+          <a:p>
+            <a:pPr indent="-342900">
+              <a:lnSpc>
+                <a:spcPct val="100000"/>
+              </a:lnSpc>
+              <a:buBlip>
+                <a:blip r:embed="rId3"/>
+              </a:buBlip>
+            </a:pPr>
+            <a:r>
+              <a:rPr lang="en-US" sz="2000" dirty="0"/>
+              <a:t>Performance tracking</a:t>
+            </a:r>
+          </a:p>
+          <a:p>
+            <a:pPr indent="-342900">
+              <a:lnSpc>
+                <a:spcPct val="100000"/>
+              </a:lnSpc>
+              <a:buBlip>
+                <a:blip r:embed="rId3"/>
+              </a:buBlip>
+            </a:pPr>
+            <a:r>
+              <a:rPr lang="en-US" sz="2000" dirty="0"/>
+              <a:t>Usage tracking</a:t>
+            </a:r>
+          </a:p>
+          <a:p>
+            <a:pPr indent="-342900">
+              <a:lnSpc>
+                <a:spcPct val="100000"/>
+              </a:lnSpc>
+              <a:buBlip>
+                <a:blip r:embed="rId3"/>
+              </a:buBlip>
+            </a:pPr>
+            <a:r>
+              <a:rPr lang="en-US" sz="2000" dirty="0"/>
+              <a:t>Azure – Azure Monitor, Application Insights, Log Analytics …</a:t>
+            </a:r>
+          </a:p>
+          <a:p>
+            <a:pPr indent="-342900">
+              <a:lnSpc>
+                <a:spcPct val="100000"/>
+              </a:lnSpc>
+              <a:buBlip>
+                <a:blip r:embed="rId3"/>
+              </a:buBlip>
+            </a:pPr>
+            <a:r>
+              <a:rPr lang="en-US" sz="2000" dirty="0"/>
+              <a:t>ASP.NET Core Health Checks</a:t>
+            </a:r>
+          </a:p>
+          <a:p>
+            <a:pPr indent="-342900">
+              <a:lnSpc>
+                <a:spcPct val="100000"/>
+              </a:lnSpc>
+              <a:buBlip>
+                <a:blip r:embed="rId3"/>
+              </a:buBlip>
+            </a:pPr>
+            <a:r>
+              <a:rPr lang="en-US" sz="2000" dirty="0"/>
+              <a:t>Third-party monitoring services</a:t>
+            </a:r>
+          </a:p>
+          <a:p>
+            <a:pPr lvl="1" indent="-342900">
+              <a:lnSpc>
+                <a:spcPct val="100000"/>
+              </a:lnSpc>
+              <a:buBlip>
+                <a:blip r:embed="rId3"/>
+              </a:buBlip>
+            </a:pPr>
+            <a:r>
+              <a:rPr lang="en-US" sz="1600" dirty="0">
+                <a:hlinkClick r:id="rId4"/>
+              </a:rPr>
+              <a:t>https://newrelic.com</a:t>
+            </a:r>
+            <a:r>
+              <a:rPr lang="en-US" sz="1600" dirty="0" smtClean="0">
+                <a:hlinkClick r:id="rId4"/>
+              </a:rPr>
+              <a:t>/</a:t>
+            </a:r>
+            <a:r>
+              <a:rPr lang="en-US" sz="1600" dirty="0" smtClean="0"/>
+              <a:t> </a:t>
+            </a:r>
+            <a:endParaRPr lang="en-US" sz="1600" dirty="0"/>
+          </a:p>
+          <a:p>
+            <a:pPr lvl="1" indent="-342900">
+              <a:lnSpc>
+                <a:spcPct val="100000"/>
+              </a:lnSpc>
+              <a:buBlip>
+                <a:blip r:embed="rId3"/>
+              </a:buBlip>
+            </a:pPr>
+            <a:r>
+              <a:rPr lang="en-US" sz="1600" dirty="0">
+                <a:hlinkClick r:id="rId5"/>
+              </a:rPr>
+              <a:t>https://stackify.com</a:t>
+            </a:r>
+            <a:r>
+              <a:rPr lang="en-US" sz="1600" dirty="0" smtClean="0">
+                <a:hlinkClick r:id="rId5"/>
+              </a:rPr>
+              <a:t>/</a:t>
+            </a:r>
+            <a:r>
+              <a:rPr lang="en-US" sz="1600" dirty="0" smtClean="0"/>
+              <a:t> </a:t>
+            </a:r>
+            <a:endParaRPr lang="en-US" sz="1600" dirty="0"/>
+          </a:p>
+          <a:p>
+            <a:pPr lvl="1" indent="-342900">
+              <a:lnSpc>
+                <a:spcPct val="100000"/>
+              </a:lnSpc>
+              <a:buBlip>
+                <a:blip r:embed="rId3"/>
+              </a:buBlip>
+            </a:pPr>
+            <a:r>
+              <a:rPr lang="en-US" sz="1600" dirty="0">
+                <a:hlinkClick r:id="rId6"/>
+              </a:rPr>
+              <a:t>https://www.monitis.com</a:t>
+            </a:r>
+            <a:r>
+              <a:rPr lang="en-US" sz="1600" dirty="0" smtClean="0">
+                <a:hlinkClick r:id="rId6"/>
+              </a:rPr>
+              <a:t>/</a:t>
+            </a:r>
+            <a:r>
+              <a:rPr lang="en-US" sz="1600" dirty="0" smtClean="0"/>
+              <a:t> </a:t>
+            </a:r>
+            <a:endParaRPr lang="en-US" sz="1600" dirty="0"/>
+          </a:p>
+          <a:p>
+            <a:pPr lvl="1" indent="-342900">
+              <a:lnSpc>
+                <a:spcPct val="100000"/>
+              </a:lnSpc>
+              <a:buBlip>
+                <a:blip r:embed="rId3"/>
+              </a:buBlip>
+            </a:pPr>
+            <a:r>
+              <a:rPr lang="en-US" sz="1600" dirty="0">
+                <a:hlinkClick r:id="rId7"/>
+              </a:rPr>
+              <a:t>https://www.runscope.com</a:t>
+            </a:r>
+            <a:r>
+              <a:rPr lang="en-US" sz="1600" dirty="0" smtClean="0">
+                <a:hlinkClick r:id="rId7"/>
+              </a:rPr>
+              <a:t>/</a:t>
+            </a:r>
+            <a:r>
+              <a:rPr lang="en-US" sz="1600" dirty="0" smtClean="0"/>
+              <a:t> </a:t>
+            </a:r>
+            <a:endParaRPr lang="en-US" sz="1600" dirty="0"/>
+          </a:p>
+          <a:p>
+            <a:pPr lvl="1" indent="-342900">
+              <a:lnSpc>
+                <a:spcPct val="100000"/>
+              </a:lnSpc>
+              <a:buBlip>
+                <a:blip r:embed="rId3"/>
+              </a:buBlip>
+            </a:pPr>
+            <a:r>
+              <a:rPr lang="en-US" sz="1600" dirty="0"/>
+              <a:t>…</a:t>
+            </a:r>
           </a:p>
         </p:txBody>
       </p:sp>
     </p:spTree>
     <p:extLst>
       <p:ext uri="{BB962C8B-B14F-4D97-AF65-F5344CB8AC3E}">
-        <p14:creationId xmlns:p14="http://schemas.microsoft.com/office/powerpoint/2010/main" val="1632784218"/>
+        <p14:creationId xmlns:p14="http://schemas.microsoft.com/office/powerpoint/2010/main" val="903040751"/>
       </p:ext>
     </p:extLst>
   </p:cSld>
@@ -13314,151 +13401,49 @@
           <a:bodyPr/>
           <a:lstStyle/>
           <a:p>
-            <a:r>
-              <a:rPr lang="en-US" dirty="0" smtClean="0"/>
-              <a:t>Summary</a:t>
-            </a:r>
-            <a:endParaRPr lang="sr-Latn-BA" dirty="0"/>
-          </a:p>
-        </p:txBody>
-      </p:sp>
-      <p:sp>
-        <p:nvSpPr>
-          <p:cNvPr id="3" name="Content Placeholder 2"/>
-          <p:cNvSpPr>
-            <a:spLocks noGrp="1"/>
-          </p:cNvSpPr>
+            <a:endParaRPr lang="en-US"/>
+          </a:p>
+        </p:txBody>
+      </p:sp>
+      <p:pic>
+        <p:nvPicPr>
+          <p:cNvPr id="4" name="Content Placeholder 3"/>
+          <p:cNvPicPr>
+            <a:picLocks noGrp="1" noChangeAspect="1"/>
+          </p:cNvPicPr>
           <p:nvPr>
             <p:ph idx="1"/>
           </p:nvPr>
-        </p:nvSpPr>
-        <p:spPr/>
-        <p:txBody>
-          <a:bodyPr/>
-          <a:lstStyle/>
-          <a:p>
-            <a:pPr indent="-342900">
-              <a:buBlip>
-                <a:blip r:embed="rId2"/>
-              </a:buBlip>
-            </a:pPr>
-            <a:r>
-              <a:rPr lang="en-US" dirty="0">
-                <a:latin typeface="Montserrat Hairline"/>
-              </a:rPr>
-              <a:t>Basics – REST, ASP.NET Core</a:t>
-            </a:r>
-          </a:p>
-          <a:p>
-            <a:pPr indent="-342900">
-              <a:buBlip>
-                <a:blip r:embed="rId2"/>
-              </a:buBlip>
-            </a:pPr>
-            <a:r>
-              <a:rPr lang="en-US" dirty="0">
-                <a:latin typeface="Montserrat Hairline"/>
-              </a:rPr>
-              <a:t>Best practices</a:t>
-            </a:r>
-          </a:p>
-          <a:p>
-            <a:pPr indent="-342900">
-              <a:buBlip>
-                <a:blip r:embed="rId2"/>
-              </a:buBlip>
-            </a:pPr>
-            <a:r>
-              <a:rPr lang="en-US" dirty="0">
-                <a:latin typeface="Montserrat Hairline"/>
-              </a:rPr>
-              <a:t>Security</a:t>
-            </a:r>
-          </a:p>
-          <a:p>
-            <a:pPr indent="-342900">
-              <a:buBlip>
-                <a:blip r:embed="rId2"/>
-              </a:buBlip>
-            </a:pPr>
-            <a:r>
-              <a:rPr lang="en-US" dirty="0">
-                <a:latin typeface="Montserrat Hairline"/>
-              </a:rPr>
-              <a:t>Testing</a:t>
-            </a:r>
-          </a:p>
-          <a:p>
-            <a:pPr indent="-342900">
-              <a:buBlip>
-                <a:blip r:embed="rId2"/>
-              </a:buBlip>
-            </a:pPr>
-            <a:r>
-              <a:rPr lang="en-US" dirty="0">
-                <a:latin typeface="Montserrat Hairline"/>
-              </a:rPr>
-              <a:t>Documentation</a:t>
-            </a:r>
-          </a:p>
-          <a:p>
-            <a:pPr indent="-342900">
-              <a:buBlip>
-                <a:blip r:embed="rId2"/>
-              </a:buBlip>
-            </a:pPr>
-            <a:r>
-              <a:rPr lang="en-US" dirty="0">
-                <a:latin typeface="Montserrat Hairline"/>
-              </a:rPr>
-              <a:t>Limiting</a:t>
-            </a:r>
-          </a:p>
-          <a:p>
-            <a:pPr indent="-342900">
-              <a:buBlip>
-                <a:blip r:embed="rId2"/>
-              </a:buBlip>
-            </a:pPr>
-            <a:r>
-              <a:rPr lang="en-US" dirty="0">
-                <a:latin typeface="Montserrat Hairline"/>
-              </a:rPr>
-              <a:t>Versioning</a:t>
-            </a:r>
-          </a:p>
-          <a:p>
-            <a:pPr indent="-342900">
-              <a:buBlip>
-                <a:blip r:embed="rId2"/>
-              </a:buBlip>
-            </a:pPr>
-            <a:r>
-              <a:rPr lang="en-US" dirty="0">
-                <a:latin typeface="Montserrat Hairline"/>
-              </a:rPr>
-              <a:t>Monitoring</a:t>
-            </a:r>
-          </a:p>
-        </p:txBody>
-      </p:sp>
+        </p:nvPicPr>
+        <p:blipFill>
+          <a:blip r:embed="rId2">
+            <a:extLst>
+              <a:ext uri="{28A0092B-C50C-407E-A947-70E740481C1C}">
+                <a14:useLocalDpi xmlns:a14="http://schemas.microsoft.com/office/drawing/2010/main" val="0"/>
+              </a:ext>
+            </a:extLst>
+          </a:blip>
+          <a:stretch>
+            <a:fillRect/>
+          </a:stretch>
+        </p:blipFill>
+        <p:spPr>
+          <a:xfrm>
+            <a:off x="2906723" y="365125"/>
+            <a:ext cx="6378553" cy="5936961"/>
+          </a:xfrm>
+        </p:spPr>
+      </p:pic>
     </p:spTree>
     <p:extLst>
       <p:ext uri="{BB962C8B-B14F-4D97-AF65-F5344CB8AC3E}">
-        <p14:creationId xmlns:p14="http://schemas.microsoft.com/office/powerpoint/2010/main" val="1857778497"/>
+        <p14:creationId xmlns:p14="http://schemas.microsoft.com/office/powerpoint/2010/main" val="3666699612"/>
       </p:ext>
     </p:extLst>
   </p:cSld>
   <p:clrMapOvr>
     <a:masterClrMapping/>
   </p:clrMapOvr>
-  <p:timing>
-    <p:tnLst>
-      <p:par>
-        <p:cTn id="1" dur="indefinite" restart="never" nodeType="tmRoot"/>
-      </p:par>
-    </p:tnLst>
-  </p:timing>
 </p:sld>
 </file>
 
@@ -13481,7 +13466,7 @@
       </p:grpSpPr>
       <p:sp>
         <p:nvSpPr>
-          <p:cNvPr id="2" name="Title 1"/>
+          <p:cNvPr id="4" name="Title 3"/>
           <p:cNvSpPr>
             <a:spLocks noGrp="1"/>
           </p:cNvSpPr>
@@ -13496,7 +13481,7 @@
           <a:p>
             <a:r>
               <a:rPr lang="en-US" dirty="0" smtClean="0"/>
-              <a:t>Further reading</a:t>
+              <a:t>Closing up</a:t>
             </a:r>
             <a:endParaRPr lang="en-US" dirty="0"/>
           </a:p>
@@ -13504,341 +13489,27 @@
       </p:sp>
       <p:sp>
         <p:nvSpPr>
-          <p:cNvPr id="3" name="Content Placeholder 2"/>
-          <p:cNvSpPr>
-            <a:spLocks noGrp="1"/>
-          </p:cNvSpPr>
-          <p:nvPr>
-            <p:ph idx="1"/>
+          <p:cNvPr id="5" name="Text Placeholder 4"/>
+          <p:cNvSpPr>
+            <a:spLocks noGrp="1"/>
+          </p:cNvSpPr>
+          <p:nvPr>
+            <p:ph type="body" idx="1"/>
           </p:nvPr>
         </p:nvSpPr>
         <p:spPr/>
         <p:txBody>
-          <a:bodyPr>
-            <a:noAutofit/>
-          </a:bodyPr>
+          <a:bodyPr/>
           <a:lstStyle/>
           <a:p>
-            <a:pPr indent="-342900">
-              <a:lnSpc>
-                <a:spcPct val="100000"/>
-              </a:lnSpc>
-              <a:buBlip>
-                <a:blip r:embed="rId3"/>
-              </a:buBlip>
-            </a:pPr>
-            <a:r>
-              <a:rPr lang="en-US" sz="2000" dirty="0">
-                <a:hlinkClick r:id="rId4"/>
-              </a:rPr>
-              <a:t>https://</a:t>
-            </a:r>
-            <a:r>
-              <a:rPr lang="en-US" sz="2000" dirty="0" smtClean="0">
-                <a:hlinkClick r:id="rId4"/>
-              </a:rPr>
-              <a:t>github.com/microsoft/api-guidelines</a:t>
-            </a:r>
-            <a:r>
-              <a:rPr lang="en-US" sz="2000" dirty="0" smtClean="0"/>
-              <a:t> </a:t>
-            </a:r>
-            <a:endParaRPr lang="en-US" sz="2000" dirty="0"/>
-          </a:p>
-          <a:p>
-            <a:pPr indent="-342900">
-              <a:lnSpc>
-                <a:spcPct val="100000"/>
-              </a:lnSpc>
-              <a:buBlip>
-                <a:blip r:embed="rId3"/>
-              </a:buBlip>
-            </a:pPr>
-            <a:r>
-              <a:rPr lang="en-US" sz="2000" dirty="0"/>
-              <a:t>Specifications</a:t>
-            </a:r>
-          </a:p>
-          <a:p>
-            <a:pPr lvl="1" indent="-342900">
-              <a:lnSpc>
-                <a:spcPct val="100000"/>
-              </a:lnSpc>
-              <a:buBlip>
-                <a:blip r:embed="rId3"/>
-              </a:buBlip>
-            </a:pPr>
-            <a:r>
-              <a:rPr lang="en-US" sz="1600" dirty="0"/>
-              <a:t>HATEOAS – Hypermedia as the Engine of Application State</a:t>
-            </a:r>
-          </a:p>
-          <a:p>
-            <a:pPr lvl="1" indent="-342900">
-              <a:lnSpc>
-                <a:spcPct val="100000"/>
-              </a:lnSpc>
-              <a:buBlip>
-                <a:blip r:embed="rId3"/>
-              </a:buBlip>
-            </a:pPr>
-            <a:r>
-              <a:rPr lang="en-US" sz="1600" dirty="0">
-                <a:hlinkClick r:id="rId5"/>
-              </a:rPr>
-              <a:t>https://ionwg.org</a:t>
-            </a:r>
-            <a:r>
-              <a:rPr lang="en-US" sz="1600" dirty="0" smtClean="0">
-                <a:hlinkClick r:id="rId5"/>
-              </a:rPr>
-              <a:t>/</a:t>
-            </a:r>
-            <a:r>
-              <a:rPr lang="en-US" sz="1600" dirty="0" smtClean="0"/>
-              <a:t> - </a:t>
-            </a:r>
-            <a:r>
-              <a:rPr lang="en-US" sz="1600" dirty="0"/>
-              <a:t>The ION Hypermedia Type</a:t>
-            </a:r>
-          </a:p>
-          <a:p>
-            <a:pPr lvl="1" indent="-342900">
-              <a:lnSpc>
-                <a:spcPct val="100000"/>
-              </a:lnSpc>
-              <a:buBlip>
-                <a:blip r:embed="rId3"/>
-              </a:buBlip>
-            </a:pPr>
-            <a:r>
-              <a:rPr lang="en-US" sz="1600" dirty="0">
-                <a:hlinkClick r:id="rId6"/>
-              </a:rPr>
-              <a:t>http://jsonapi.org</a:t>
-            </a:r>
-            <a:r>
-              <a:rPr lang="en-US" sz="1600" dirty="0" smtClean="0">
-                <a:hlinkClick r:id="rId6"/>
-              </a:rPr>
-              <a:t>/</a:t>
-            </a:r>
-            <a:r>
-              <a:rPr lang="en-US" sz="1600" dirty="0" smtClean="0"/>
-              <a:t> - </a:t>
-            </a:r>
-            <a:r>
-              <a:rPr lang="en-US" sz="1600" dirty="0"/>
-              <a:t>JSON API Specification</a:t>
-            </a:r>
-          </a:p>
-          <a:p>
-            <a:pPr lvl="1" indent="-342900">
-              <a:lnSpc>
-                <a:spcPct val="100000"/>
-              </a:lnSpc>
-              <a:buBlip>
-                <a:blip r:embed="rId3"/>
-              </a:buBlip>
-            </a:pPr>
-            <a:r>
-              <a:rPr lang="en-US" sz="1600" dirty="0">
-                <a:hlinkClick r:id="rId7"/>
-              </a:rPr>
-              <a:t>http://json-schema.org</a:t>
-            </a:r>
-            <a:r>
-              <a:rPr lang="en-US" sz="1600" dirty="0" smtClean="0">
-                <a:hlinkClick r:id="rId7"/>
-              </a:rPr>
-              <a:t>/</a:t>
-            </a:r>
-            <a:r>
-              <a:rPr lang="en-US" sz="1600" dirty="0" smtClean="0"/>
-              <a:t> - </a:t>
-            </a:r>
-            <a:r>
-              <a:rPr lang="en-US" sz="1600" dirty="0"/>
-              <a:t>JSON (Hyper-)Schema...</a:t>
-            </a:r>
-          </a:p>
-          <a:p>
-            <a:pPr indent="-342900">
-              <a:lnSpc>
-                <a:spcPct val="100000"/>
-              </a:lnSpc>
-              <a:buBlip>
-                <a:blip r:embed="rId3"/>
-              </a:buBlip>
-            </a:pPr>
-            <a:r>
-              <a:rPr lang="en-US" dirty="0">
-                <a:hlinkClick r:id="rId8"/>
-              </a:rPr>
-              <a:t>http://graphql.org</a:t>
-            </a:r>
-            <a:r>
-              <a:rPr lang="en-US" dirty="0" smtClean="0">
-                <a:hlinkClick r:id="rId8"/>
-              </a:rPr>
-              <a:t>/</a:t>
-            </a:r>
-            <a:r>
-              <a:rPr lang="en-US" dirty="0" smtClean="0"/>
-              <a:t> - </a:t>
-            </a:r>
-            <a:r>
-              <a:rPr lang="en-US" dirty="0" err="1"/>
-              <a:t>GraphQL</a:t>
-            </a:r>
-            <a:endParaRPr lang="en-US" dirty="0"/>
-          </a:p>
-          <a:p>
-            <a:pPr indent="-342900">
-              <a:lnSpc>
-                <a:spcPct val="100000"/>
-              </a:lnSpc>
-              <a:buBlip>
-                <a:blip r:embed="rId3"/>
-              </a:buBlip>
-            </a:pPr>
-            <a:r>
-              <a:rPr lang="en-US" sz="2000" dirty="0"/>
-              <a:t>APIs</a:t>
-            </a:r>
-          </a:p>
-          <a:p>
-            <a:pPr lvl="1" indent="-342900">
-              <a:lnSpc>
-                <a:spcPct val="100000"/>
-              </a:lnSpc>
-              <a:buBlip>
-                <a:blip r:embed="rId3"/>
-              </a:buBlip>
-            </a:pPr>
-            <a:r>
-              <a:rPr lang="en-US" sz="1600" dirty="0">
-                <a:hlinkClick r:id="rId9"/>
-              </a:rPr>
-              <a:t>https://</a:t>
-            </a:r>
-            <a:r>
-              <a:rPr lang="en-US" sz="1600" dirty="0" smtClean="0">
-                <a:hlinkClick r:id="rId9"/>
-              </a:rPr>
-              <a:t>dev.twitter.com/rest/public</a:t>
-            </a:r>
-            <a:r>
-              <a:rPr lang="en-US" sz="1600" dirty="0" smtClean="0"/>
-              <a:t> - </a:t>
-            </a:r>
-            <a:r>
-              <a:rPr lang="en-US" sz="1600" dirty="0"/>
-              <a:t>Twitter REST</a:t>
-            </a:r>
-          </a:p>
-          <a:p>
-            <a:pPr lvl="1" indent="-342900">
-              <a:lnSpc>
-                <a:spcPct val="100000"/>
-              </a:lnSpc>
-              <a:buBlip>
-                <a:blip r:embed="rId3"/>
-              </a:buBlip>
-            </a:pPr>
-            <a:r>
-              <a:rPr lang="en-US" sz="1600" dirty="0">
-                <a:hlinkClick r:id="rId10"/>
-              </a:rPr>
-              <a:t>https://developer.github.com/v3</a:t>
-            </a:r>
-            <a:r>
-              <a:rPr lang="en-US" sz="1600" dirty="0" smtClean="0">
-                <a:hlinkClick r:id="rId10"/>
-              </a:rPr>
-              <a:t>/</a:t>
-            </a:r>
-            <a:r>
-              <a:rPr lang="en-US" sz="1600" dirty="0" smtClean="0"/>
-              <a:t> - </a:t>
-            </a:r>
-            <a:r>
-              <a:rPr lang="en-US" sz="1600" dirty="0"/>
-              <a:t>GitHub REST / v4 </a:t>
-            </a:r>
-            <a:r>
-              <a:rPr lang="en-US" sz="1600" dirty="0" err="1"/>
-              <a:t>GraphQL</a:t>
-            </a:r>
-            <a:endParaRPr lang="en-US" sz="1600" dirty="0"/>
-          </a:p>
-          <a:p>
-            <a:pPr lvl="1" indent="-342900">
-              <a:lnSpc>
-                <a:spcPct val="100000"/>
-              </a:lnSpc>
-              <a:buBlip>
-                <a:blip r:embed="rId3"/>
-              </a:buBlip>
-            </a:pPr>
-            <a:r>
-              <a:rPr lang="en-US" sz="1600" dirty="0">
-                <a:hlinkClick r:id="rId11"/>
-              </a:rPr>
-              <a:t>https://</a:t>
-            </a:r>
-            <a:r>
-              <a:rPr lang="en-US" sz="1600" dirty="0" smtClean="0">
-                <a:hlinkClick r:id="rId11"/>
-              </a:rPr>
-              <a:t>stripe.com/docs/api</a:t>
-            </a:r>
-            <a:r>
-              <a:rPr lang="en-US" sz="1600" dirty="0" smtClean="0"/>
-              <a:t> - </a:t>
-            </a:r>
-            <a:r>
-              <a:rPr lang="en-US" sz="1600" dirty="0"/>
-              <a:t>Stripe</a:t>
-            </a:r>
-          </a:p>
-          <a:p>
-            <a:pPr lvl="1" indent="-342900">
-              <a:lnSpc>
-                <a:spcPct val="100000"/>
-              </a:lnSpc>
-              <a:buBlip>
-                <a:blip r:embed="rId3"/>
-              </a:buBlip>
-            </a:pPr>
-            <a:r>
-              <a:rPr lang="en-US" sz="1600" dirty="0">
-                <a:hlinkClick r:id="rId12"/>
-              </a:rPr>
-              <a:t>https://</a:t>
-            </a:r>
-            <a:r>
-              <a:rPr lang="en-US" sz="1600" dirty="0" smtClean="0">
-                <a:hlinkClick r:id="rId12"/>
-              </a:rPr>
-              <a:t>www.twilio.com/docs/api/rest</a:t>
-            </a:r>
-            <a:r>
-              <a:rPr lang="en-US" sz="1600" dirty="0" smtClean="0"/>
-              <a:t> - </a:t>
-            </a:r>
-            <a:r>
-              <a:rPr lang="en-US" sz="1600" dirty="0"/>
-              <a:t>Twilio</a:t>
-            </a:r>
+            <a:endParaRPr lang="en-US"/>
           </a:p>
         </p:txBody>
       </p:sp>
     </p:spTree>
     <p:extLst>
       <p:ext uri="{BB962C8B-B14F-4D97-AF65-F5344CB8AC3E}">
-        <p14:creationId xmlns:p14="http://schemas.microsoft.com/office/powerpoint/2010/main" val="1374333779"/>
+        <p14:creationId xmlns:p14="http://schemas.microsoft.com/office/powerpoint/2010/main" val="1632784218"/>
       </p:ext>
     </p:extLst>
   </p:cSld>
@@ -13994,15 +13665,7 @@
                 <a:cs typeface="Arial" panose="020B0604020202020204" pitchFamily="34" charset="0"/>
                 <a:hlinkClick r:id="rId3"/>
               </a:rPr>
-              <a:t>https://</a:t>
-            </a:r>
-            <a:r>
-              <a:rPr lang="sr-Latn-BA" sz="1400" dirty="0" smtClean="0">
-                <a:latin typeface="Arial" panose="020B0604020202020204" pitchFamily="34" charset="0"/>
-                <a:cs typeface="Arial" panose="020B0604020202020204" pitchFamily="34" charset="0"/>
-                <a:hlinkClick r:id="rId3"/>
-              </a:rPr>
-              <a:t>miroslavpopovic.com</a:t>
+              <a:t>https://miroslavpopovic.com</a:t>
             </a:r>
             <a:endParaRPr lang="sr-Latn-BA" sz="1400" dirty="0" smtClean="0">
               <a:latin typeface="Arial" panose="020B0604020202020204" pitchFamily="34" charset="0"/>
@@ -14080,7 +13743,7 @@
           <a:p>
             <a:r>
               <a:rPr lang="en-US" dirty="0" smtClean="0"/>
-              <a:t>Samples</a:t>
+              <a:t>Summary</a:t>
             </a:r>
             <a:endParaRPr lang="sr-Latn-BA" dirty="0"/>
           </a:p>
@@ -14109,38 +13772,8 @@
             <a:r>
               <a:rPr lang="en-US" dirty="0">
                 <a:latin typeface="Montserrat Hairline"/>
-                <a:hlinkClick r:id="rId3"/>
               </a:rPr>
-              <a:t>https://</a:t>
-            </a:r>
-            <a:r>
-              <a:rPr lang="en-US" dirty="0" smtClean="0">
-                <a:latin typeface="Montserrat Hairline"/>
-                <a:hlinkClick r:id="rId3"/>
-              </a:rPr>
-              <a:t>github.com/nbarbettini/BeautifulRestApi</a:t>
-            </a:r>
-            <a:r>
-              <a:rPr lang="en-US" dirty="0" smtClean="0">
-                <a:latin typeface="Montserrat Hairline"/>
-              </a:rPr>
-              <a:t>  </a:t>
-            </a:r>
-            <a:endParaRPr lang="en-US" dirty="0">
-              <a:latin typeface="Montserrat Hairline"/>
-            </a:endParaRPr>
-          </a:p>
-          <a:p>
-            <a:pPr lvl="1" indent="-342900">
-              <a:buBlip>
-                <a:blip r:embed="rId2"/>
-              </a:buBlip>
-            </a:pPr>
-            <a:r>
-              <a:rPr lang="en-US" dirty="0">
-                <a:latin typeface="Montserrat Hairline"/>
-              </a:rPr>
-              <a:t>samples and video course</a:t>
+              <a:t>Basics – REST, ASP.NET Core</a:t>
             </a:r>
           </a:p>
           <a:p>
@@ -14152,38 +13785,8 @@
             <a:r>
               <a:rPr lang="en-US" dirty="0">
                 <a:latin typeface="Montserrat Hairline"/>
-                <a:hlinkClick r:id="rId4"/>
               </a:rPr>
-              <a:t>https://</a:t>
-            </a:r>
-            <a:r>
-              <a:rPr lang="en-US" dirty="0" smtClean="0">
-                <a:latin typeface="Montserrat Hairline"/>
-                <a:hlinkClick r:id="rId4"/>
-              </a:rPr>
-              <a:t>github.com/dodyg/practical-aspnetcore</a:t>
-            </a:r>
-            <a:r>
-              <a:rPr lang="en-US" dirty="0" smtClean="0">
-                <a:latin typeface="Montserrat Hairline"/>
-              </a:rPr>
-              <a:t>  </a:t>
-            </a:r>
-            <a:endParaRPr lang="en-US" dirty="0">
-              <a:latin typeface="Montserrat Hairline"/>
-            </a:endParaRPr>
-          </a:p>
-          <a:p>
-            <a:pPr lvl="1" indent="-342900">
-              <a:buBlip>
-                <a:blip r:embed="rId2"/>
-              </a:buBlip>
-            </a:pPr>
-            <a:r>
-              <a:rPr lang="en-US" dirty="0">
-                <a:latin typeface="Montserrat Hairline"/>
-              </a:rPr>
-              <a:t>200+ ASP.NET Core samples</a:t>
+              <a:t>Best practices</a:t>
             </a:r>
           </a:p>
           <a:p>
@@ -14195,33 +13798,81 @@
             <a:r>
               <a:rPr lang="en-US" dirty="0">
                 <a:latin typeface="Montserrat Hairline"/>
-                <a:hlinkClick r:id="rId5"/>
               </a:rPr>
-              <a:t>https://</a:t>
-            </a:r>
-            <a:r>
-              <a:rPr lang="en-US" dirty="0" smtClean="0">
-                <a:latin typeface="Montserrat Hairline"/>
-                <a:hlinkClick r:id="rId5"/>
-              </a:rPr>
-              <a:t>github.com/miroslavpopovic/production-ready-apis-sample-3.0</a:t>
-            </a:r>
-            <a:r>
-              <a:rPr lang="en-US" dirty="0" smtClean="0">
+              <a:t>Security</a:t>
+            </a:r>
+          </a:p>
+          <a:p>
+            <a:pPr indent="-342900">
+              <a:buBlip>
+                <a:blip r:embed="rId2"/>
+              </a:buBlip>
+            </a:pPr>
+            <a:r>
+              <a:rPr lang="en-US" dirty="0">
                 <a:latin typeface="Montserrat Hairline"/>
               </a:rPr>
-              <a:t>  </a:t>
-            </a:r>
-            <a:endParaRPr lang="en-US" dirty="0">
-              <a:latin typeface="Montserrat Hairline"/>
-            </a:endParaRPr>
+              <a:t>Testing</a:t>
+            </a:r>
+          </a:p>
+          <a:p>
+            <a:pPr indent="-342900">
+              <a:buBlip>
+                <a:blip r:embed="rId2"/>
+              </a:buBlip>
+            </a:pPr>
+            <a:r>
+              <a:rPr lang="en-US" dirty="0">
+                <a:latin typeface="Montserrat Hairline"/>
+              </a:rPr>
+              <a:t>Documentation</a:t>
+            </a:r>
+          </a:p>
+          <a:p>
+            <a:pPr indent="-342900">
+              <a:buBlip>
+                <a:blip r:embed="rId2"/>
+              </a:buBlip>
+            </a:pPr>
+            <a:r>
+              <a:rPr lang="en-US" dirty="0">
+                <a:latin typeface="Montserrat Hairline"/>
+              </a:rPr>
+              <a:t>Limiting</a:t>
+            </a:r>
+          </a:p>
+          <a:p>
+            <a:pPr indent="-342900">
+              <a:buBlip>
+                <a:blip r:embed="rId2"/>
+              </a:buBlip>
+            </a:pPr>
+            <a:r>
+              <a:rPr lang="en-US" dirty="0">
+                <a:latin typeface="Montserrat Hairline"/>
+              </a:rPr>
+              <a:t>Versioning</a:t>
+            </a:r>
+          </a:p>
+          <a:p>
+            <a:pPr indent="-342900">
+              <a:buBlip>
+                <a:blip r:embed="rId2"/>
+              </a:buBlip>
+            </a:pPr>
+            <a:r>
+              <a:rPr lang="en-US" dirty="0">
+                <a:latin typeface="Montserrat Hairline"/>
+              </a:rPr>
+              <a:t>Monitoring</a:t>
+            </a:r>
           </a:p>
         </p:txBody>
       </p:sp>
     </p:spTree>
     <p:extLst>
       <p:ext uri="{BB962C8B-B14F-4D97-AF65-F5344CB8AC3E}">
-        <p14:creationId xmlns:p14="http://schemas.microsoft.com/office/powerpoint/2010/main" val="4115157632"/>
+        <p14:creationId xmlns:p14="http://schemas.microsoft.com/office/powerpoint/2010/main" val="1857778497"/>
       </p:ext>
     </p:extLst>
   </p:cSld>
@@ -14257,6 +13908,591 @@
       </p:grpSpPr>
       <p:sp>
         <p:nvSpPr>
+          <p:cNvPr id="2" name="Title 1"/>
+          <p:cNvSpPr>
+            <a:spLocks noGrp="1"/>
+          </p:cNvSpPr>
+          <p:nvPr>
+            <p:ph type="title"/>
+          </p:nvPr>
+        </p:nvSpPr>
+        <p:spPr/>
+        <p:txBody>
+          <a:bodyPr/>
+          <a:lstStyle/>
+          <a:p>
+            <a:r>
+              <a:rPr lang="en-US" dirty="0" smtClean="0"/>
+              <a:t>Further reading</a:t>
+            </a:r>
+            <a:endParaRPr lang="en-US" dirty="0"/>
+          </a:p>
+        </p:txBody>
+      </p:sp>
+      <p:sp>
+        <p:nvSpPr>
+          <p:cNvPr id="3" name="Content Placeholder 2"/>
+          <p:cNvSpPr>
+            <a:spLocks noGrp="1"/>
+          </p:cNvSpPr>
+          <p:nvPr>
+            <p:ph idx="1"/>
+          </p:nvPr>
+        </p:nvSpPr>
+        <p:spPr/>
+        <p:txBody>
+          <a:bodyPr>
+            <a:noAutofit/>
+          </a:bodyPr>
+          <a:lstStyle/>
+          <a:p>
+            <a:pPr indent="-342900">
+              <a:lnSpc>
+                <a:spcPct val="100000"/>
+              </a:lnSpc>
+              <a:buBlip>
+                <a:blip r:embed="rId3"/>
+              </a:buBlip>
+            </a:pPr>
+            <a:r>
+              <a:rPr lang="en-US" sz="2000" dirty="0">
+                <a:hlinkClick r:id="rId4"/>
+              </a:rPr>
+              <a:t>https://</a:t>
+            </a:r>
+            <a:r>
+              <a:rPr lang="en-US" sz="2000" dirty="0" smtClean="0">
+                <a:hlinkClick r:id="rId4"/>
+              </a:rPr>
+              <a:t>github.com/microsoft/api-guidelines</a:t>
+            </a:r>
+            <a:r>
+              <a:rPr lang="en-US" sz="2000" dirty="0" smtClean="0"/>
+              <a:t> </a:t>
+            </a:r>
+            <a:endParaRPr lang="en-US" sz="2000" dirty="0"/>
+          </a:p>
+          <a:p>
+            <a:pPr indent="-342900">
+              <a:lnSpc>
+                <a:spcPct val="100000"/>
+              </a:lnSpc>
+              <a:buBlip>
+                <a:blip r:embed="rId3"/>
+              </a:buBlip>
+            </a:pPr>
+            <a:r>
+              <a:rPr lang="en-US" sz="2000" dirty="0"/>
+              <a:t>Specifications</a:t>
+            </a:r>
+          </a:p>
+          <a:p>
+            <a:pPr lvl="1" indent="-342900">
+              <a:lnSpc>
+                <a:spcPct val="100000"/>
+              </a:lnSpc>
+              <a:buBlip>
+                <a:blip r:embed="rId3"/>
+              </a:buBlip>
+            </a:pPr>
+            <a:r>
+              <a:rPr lang="en-US" sz="1600" dirty="0"/>
+              <a:t>HATEOAS – Hypermedia as the Engine of Application State</a:t>
+            </a:r>
+          </a:p>
+          <a:p>
+            <a:pPr lvl="1" indent="-342900">
+              <a:lnSpc>
+                <a:spcPct val="100000"/>
+              </a:lnSpc>
+              <a:buBlip>
+                <a:blip r:embed="rId3"/>
+              </a:buBlip>
+            </a:pPr>
+            <a:r>
+              <a:rPr lang="en-US" sz="1600" dirty="0">
+                <a:hlinkClick r:id="rId5"/>
+              </a:rPr>
+              <a:t>https://ionwg.org</a:t>
+            </a:r>
+            <a:r>
+              <a:rPr lang="en-US" sz="1600" dirty="0" smtClean="0">
+                <a:hlinkClick r:id="rId5"/>
+              </a:rPr>
+              <a:t>/</a:t>
+            </a:r>
+            <a:r>
+              <a:rPr lang="en-US" sz="1600" dirty="0" smtClean="0"/>
+              <a:t> - </a:t>
+            </a:r>
+            <a:r>
+              <a:rPr lang="en-US" sz="1600" dirty="0"/>
+              <a:t>The ION Hypermedia Type</a:t>
+            </a:r>
+          </a:p>
+          <a:p>
+            <a:pPr lvl="1" indent="-342900">
+              <a:lnSpc>
+                <a:spcPct val="100000"/>
+              </a:lnSpc>
+              <a:buBlip>
+                <a:blip r:embed="rId3"/>
+              </a:buBlip>
+            </a:pPr>
+            <a:r>
+              <a:rPr lang="en-US" sz="1600" dirty="0">
+                <a:hlinkClick r:id="rId6"/>
+              </a:rPr>
+              <a:t>http://jsonapi.org</a:t>
+            </a:r>
+            <a:r>
+              <a:rPr lang="en-US" sz="1600" dirty="0" smtClean="0">
+                <a:hlinkClick r:id="rId6"/>
+              </a:rPr>
+              <a:t>/</a:t>
+            </a:r>
+            <a:r>
+              <a:rPr lang="en-US" sz="1600" dirty="0" smtClean="0"/>
+              <a:t> - </a:t>
+            </a:r>
+            <a:r>
+              <a:rPr lang="en-US" sz="1600" dirty="0"/>
+              <a:t>JSON API Specification</a:t>
+            </a:r>
+          </a:p>
+          <a:p>
+            <a:pPr lvl="1" indent="-342900">
+              <a:lnSpc>
+                <a:spcPct val="100000"/>
+              </a:lnSpc>
+              <a:buBlip>
+                <a:blip r:embed="rId3"/>
+              </a:buBlip>
+            </a:pPr>
+            <a:r>
+              <a:rPr lang="en-US" sz="1600" dirty="0">
+                <a:hlinkClick r:id="rId7"/>
+              </a:rPr>
+              <a:t>http://json-schema.org</a:t>
+            </a:r>
+            <a:r>
+              <a:rPr lang="en-US" sz="1600" dirty="0" smtClean="0">
+                <a:hlinkClick r:id="rId7"/>
+              </a:rPr>
+              <a:t>/</a:t>
+            </a:r>
+            <a:r>
+              <a:rPr lang="en-US" sz="1600" dirty="0" smtClean="0"/>
+              <a:t> - </a:t>
+            </a:r>
+            <a:r>
+              <a:rPr lang="en-US" sz="1600" dirty="0"/>
+              <a:t>JSON (Hyper-)Schema...</a:t>
+            </a:r>
+          </a:p>
+          <a:p>
+            <a:pPr indent="-342900">
+              <a:lnSpc>
+                <a:spcPct val="100000"/>
+              </a:lnSpc>
+              <a:buBlip>
+                <a:blip r:embed="rId3"/>
+              </a:buBlip>
+            </a:pPr>
+            <a:r>
+              <a:rPr lang="en-US" dirty="0">
+                <a:hlinkClick r:id="rId8"/>
+              </a:rPr>
+              <a:t>http://graphql.org</a:t>
+            </a:r>
+            <a:r>
+              <a:rPr lang="en-US" dirty="0" smtClean="0">
+                <a:hlinkClick r:id="rId8"/>
+              </a:rPr>
+              <a:t>/</a:t>
+            </a:r>
+            <a:r>
+              <a:rPr lang="en-US" dirty="0" smtClean="0"/>
+              <a:t> - </a:t>
+            </a:r>
+            <a:r>
+              <a:rPr lang="en-US" dirty="0" err="1"/>
+              <a:t>GraphQL</a:t>
+            </a:r>
+            <a:endParaRPr lang="en-US" dirty="0"/>
+          </a:p>
+          <a:p>
+            <a:pPr indent="-342900">
+              <a:lnSpc>
+                <a:spcPct val="100000"/>
+              </a:lnSpc>
+              <a:buBlip>
+                <a:blip r:embed="rId3"/>
+              </a:buBlip>
+            </a:pPr>
+            <a:r>
+              <a:rPr lang="en-US" sz="2000" dirty="0"/>
+              <a:t>APIs</a:t>
+            </a:r>
+          </a:p>
+          <a:p>
+            <a:pPr lvl="1" indent="-342900">
+              <a:lnSpc>
+                <a:spcPct val="100000"/>
+              </a:lnSpc>
+              <a:buBlip>
+                <a:blip r:embed="rId3"/>
+              </a:buBlip>
+            </a:pPr>
+            <a:r>
+              <a:rPr lang="en-US" sz="1600" dirty="0">
+                <a:hlinkClick r:id="rId9"/>
+              </a:rPr>
+              <a:t>https://</a:t>
+            </a:r>
+            <a:r>
+              <a:rPr lang="en-US" sz="1600" dirty="0" smtClean="0">
+                <a:hlinkClick r:id="rId9"/>
+              </a:rPr>
+              <a:t>dev.twitter.com/rest/public</a:t>
+            </a:r>
+            <a:r>
+              <a:rPr lang="en-US" sz="1600" dirty="0" smtClean="0"/>
+              <a:t> - </a:t>
+            </a:r>
+            <a:r>
+              <a:rPr lang="en-US" sz="1600" dirty="0"/>
+              <a:t>Twitter REST</a:t>
+            </a:r>
+          </a:p>
+          <a:p>
+            <a:pPr lvl="1" indent="-342900">
+              <a:lnSpc>
+                <a:spcPct val="100000"/>
+              </a:lnSpc>
+              <a:buBlip>
+                <a:blip r:embed="rId3"/>
+              </a:buBlip>
+            </a:pPr>
+            <a:r>
+              <a:rPr lang="en-US" sz="1600" dirty="0">
+                <a:hlinkClick r:id="rId10"/>
+              </a:rPr>
+              <a:t>https://developer.github.com/v3</a:t>
+            </a:r>
+            <a:r>
+              <a:rPr lang="en-US" sz="1600" dirty="0" smtClean="0">
+                <a:hlinkClick r:id="rId10"/>
+              </a:rPr>
+              <a:t>/</a:t>
+            </a:r>
+            <a:r>
+              <a:rPr lang="en-US" sz="1600" dirty="0" smtClean="0"/>
+              <a:t> - </a:t>
+            </a:r>
+            <a:r>
+              <a:rPr lang="en-US" sz="1600" dirty="0"/>
+              <a:t>GitHub REST / v4 </a:t>
+            </a:r>
+            <a:r>
+              <a:rPr lang="en-US" sz="1600" dirty="0" err="1"/>
+              <a:t>GraphQL</a:t>
+            </a:r>
+            <a:endParaRPr lang="en-US" sz="1600" dirty="0"/>
+          </a:p>
+          <a:p>
+            <a:pPr lvl="1" indent="-342900">
+              <a:lnSpc>
+                <a:spcPct val="100000"/>
+              </a:lnSpc>
+              <a:buBlip>
+                <a:blip r:embed="rId3"/>
+              </a:buBlip>
+            </a:pPr>
+            <a:r>
+              <a:rPr lang="en-US" sz="1600" dirty="0">
+                <a:hlinkClick r:id="rId11"/>
+              </a:rPr>
+              <a:t>https://</a:t>
+            </a:r>
+            <a:r>
+              <a:rPr lang="en-US" sz="1600" dirty="0" smtClean="0">
+                <a:hlinkClick r:id="rId11"/>
+              </a:rPr>
+              <a:t>stripe.com/docs/api</a:t>
+            </a:r>
+            <a:r>
+              <a:rPr lang="en-US" sz="1600" dirty="0" smtClean="0"/>
+              <a:t> - </a:t>
+            </a:r>
+            <a:r>
+              <a:rPr lang="en-US" sz="1600" dirty="0"/>
+              <a:t>Stripe</a:t>
+            </a:r>
+          </a:p>
+          <a:p>
+            <a:pPr lvl="1" indent="-342900">
+              <a:lnSpc>
+                <a:spcPct val="100000"/>
+              </a:lnSpc>
+              <a:buBlip>
+                <a:blip r:embed="rId3"/>
+              </a:buBlip>
+            </a:pPr>
+            <a:r>
+              <a:rPr lang="en-US" sz="1600" dirty="0">
+                <a:hlinkClick r:id="rId12"/>
+              </a:rPr>
+              <a:t>https://</a:t>
+            </a:r>
+            <a:r>
+              <a:rPr lang="en-US" sz="1600" dirty="0" smtClean="0">
+                <a:hlinkClick r:id="rId12"/>
+              </a:rPr>
+              <a:t>www.twilio.com/docs/api/rest</a:t>
+            </a:r>
+            <a:r>
+              <a:rPr lang="en-US" sz="1600" dirty="0" smtClean="0"/>
+              <a:t> - </a:t>
+            </a:r>
+            <a:r>
+              <a:rPr lang="en-US" sz="1600" dirty="0"/>
+              <a:t>Twilio</a:t>
+            </a:r>
+          </a:p>
+        </p:txBody>
+      </p:sp>
+    </p:spTree>
+    <p:extLst>
+      <p:ext uri="{BB962C8B-B14F-4D97-AF65-F5344CB8AC3E}">
+        <p14:creationId xmlns:p14="http://schemas.microsoft.com/office/powerpoint/2010/main" val="1374333779"/>
+      </p:ext>
+    </p:extLst>
+  </p:cSld>
+  <p:clrMapOvr>
+    <a:masterClrMapping/>
+  </p:clrMapOvr>
+  <p:timing>
+    <p:tnLst>
+      <p:par>
+        <p:cTn id="1" dur="indefinite" restart="never" nodeType="tmRoot"/>
+      </p:par>
+    </p:tnLst>
+  </p:timing>
+</p:sld>
+</file>
+
+<file path=ppt/slides/slide22.xml><?xml version="1.0" encoding="utf-8"?>
+<p:sld xmlns:a="http://schemas.openxmlformats.org/drawingml/2006/main" xmlns:r="http://schemas.openxmlformats.org/officeDocument/2006/relationships" xmlns:p="http://schemas.openxmlformats.org/presentationml/2006/main">
+  <p:cSld>
+    <p:spTree>
+      <p:nvGrpSpPr>
+        <p:cNvPr id="1" name=""/>
+        <p:cNvGrpSpPr/>
+        <p:nvPr/>
+      </p:nvGrpSpPr>
+      <p:grpSpPr>
+        <a:xfrm>
+          <a:off x="0" y="0"/>
+          <a:ext cx="0" cy="0"/>
+          <a:chOff x="0" y="0"/>
+          <a:chExt cx="0" cy="0"/>
+        </a:xfrm>
+      </p:grpSpPr>
+      <p:sp>
+        <p:nvSpPr>
+          <p:cNvPr id="2" name="Title 1"/>
+          <p:cNvSpPr>
+            <a:spLocks noGrp="1"/>
+          </p:cNvSpPr>
+          <p:nvPr>
+            <p:ph type="title"/>
+          </p:nvPr>
+        </p:nvSpPr>
+        <p:spPr/>
+        <p:txBody>
+          <a:bodyPr/>
+          <a:lstStyle/>
+          <a:p>
+            <a:r>
+              <a:rPr lang="en-US" dirty="0" smtClean="0"/>
+              <a:t>Samples</a:t>
+            </a:r>
+            <a:endParaRPr lang="sr-Latn-BA" dirty="0"/>
+          </a:p>
+        </p:txBody>
+      </p:sp>
+      <p:sp>
+        <p:nvSpPr>
+          <p:cNvPr id="3" name="Content Placeholder 2"/>
+          <p:cNvSpPr>
+            <a:spLocks noGrp="1"/>
+          </p:cNvSpPr>
+          <p:nvPr>
+            <p:ph idx="1"/>
+          </p:nvPr>
+        </p:nvSpPr>
+        <p:spPr/>
+        <p:txBody>
+          <a:bodyPr/>
+          <a:lstStyle/>
+          <a:p>
+            <a:pPr indent="-342900">
+              <a:buBlip>
+                <a:blip r:embed="rId2"/>
+              </a:buBlip>
+            </a:pPr>
+            <a:r>
+              <a:rPr lang="en-US" dirty="0">
+                <a:latin typeface="Montserrat Hairline"/>
+                <a:hlinkClick r:id="rId3"/>
+              </a:rPr>
+              <a:t>https://</a:t>
+            </a:r>
+            <a:r>
+              <a:rPr lang="en-US" dirty="0" smtClean="0">
+                <a:latin typeface="Montserrat Hairline"/>
+                <a:hlinkClick r:id="rId3"/>
+              </a:rPr>
+              <a:t>github.com/nbarbettini/BeautifulRestApi</a:t>
+            </a:r>
+            <a:r>
+              <a:rPr lang="en-US" dirty="0" smtClean="0">
+                <a:latin typeface="Montserrat Hairline"/>
+              </a:rPr>
+              <a:t>  </a:t>
+            </a:r>
+            <a:endParaRPr lang="en-US" dirty="0">
+              <a:latin typeface="Montserrat Hairline"/>
+            </a:endParaRPr>
+          </a:p>
+          <a:p>
+            <a:pPr lvl="1" indent="-342900">
+              <a:buBlip>
+                <a:blip r:embed="rId2"/>
+              </a:buBlip>
+            </a:pPr>
+            <a:r>
+              <a:rPr lang="en-US" dirty="0">
+                <a:latin typeface="Montserrat Hairline"/>
+              </a:rPr>
+              <a:t>samples and video course</a:t>
+            </a:r>
+          </a:p>
+          <a:p>
+            <a:pPr indent="-342900">
+              <a:buBlip>
+                <a:blip r:embed="rId2"/>
+              </a:buBlip>
+            </a:pPr>
+            <a:r>
+              <a:rPr lang="en-US" dirty="0">
+                <a:latin typeface="Montserrat Hairline"/>
+                <a:hlinkClick r:id="rId4"/>
+              </a:rPr>
+              <a:t>https://</a:t>
+            </a:r>
+            <a:r>
+              <a:rPr lang="en-US" dirty="0" smtClean="0">
+                <a:latin typeface="Montserrat Hairline"/>
+                <a:hlinkClick r:id="rId4"/>
+              </a:rPr>
+              <a:t>github.com/dodyg/practical-aspnetcore</a:t>
+            </a:r>
+            <a:r>
+              <a:rPr lang="en-US" dirty="0" smtClean="0">
+                <a:latin typeface="Montserrat Hairline"/>
+              </a:rPr>
+              <a:t>  </a:t>
+            </a:r>
+            <a:endParaRPr lang="en-US" dirty="0">
+              <a:latin typeface="Montserrat Hairline"/>
+            </a:endParaRPr>
+          </a:p>
+          <a:p>
+            <a:pPr lvl="1" indent="-342900">
+              <a:buBlip>
+                <a:blip r:embed="rId2"/>
+              </a:buBlip>
+            </a:pPr>
+            <a:r>
+              <a:rPr lang="en-US" dirty="0">
+                <a:latin typeface="Montserrat Hairline"/>
+              </a:rPr>
+              <a:t>200+ ASP.NET Core samples</a:t>
+            </a:r>
+          </a:p>
+          <a:p>
+            <a:pPr indent="-342900">
+              <a:buBlip>
+                <a:blip r:embed="rId2"/>
+              </a:buBlip>
+            </a:pPr>
+            <a:r>
+              <a:rPr lang="en-US" dirty="0">
+                <a:latin typeface="Montserrat Hairline"/>
+                <a:hlinkClick r:id="rId5"/>
+              </a:rPr>
+              <a:t>https://</a:t>
+            </a:r>
+            <a:r>
+              <a:rPr lang="en-US" dirty="0" smtClean="0">
+                <a:latin typeface="Montserrat Hairline"/>
+                <a:hlinkClick r:id="rId5"/>
+              </a:rPr>
+              <a:t>github.com/miroslavpopovic/production-ready-apis-sample-3.0</a:t>
+            </a:r>
+            <a:r>
+              <a:rPr lang="en-US" dirty="0" smtClean="0">
+                <a:latin typeface="Montserrat Hairline"/>
+              </a:rPr>
+              <a:t>  </a:t>
+            </a:r>
+            <a:endParaRPr lang="en-US" dirty="0">
+              <a:latin typeface="Montserrat Hairline"/>
+            </a:endParaRPr>
+          </a:p>
+        </p:txBody>
+      </p:sp>
+    </p:spTree>
+    <p:extLst>
+      <p:ext uri="{BB962C8B-B14F-4D97-AF65-F5344CB8AC3E}">
+        <p14:creationId xmlns:p14="http://schemas.microsoft.com/office/powerpoint/2010/main" val="4115157632"/>
+      </p:ext>
+    </p:extLst>
+  </p:cSld>
+  <p:clrMapOvr>
+    <a:masterClrMapping/>
+  </p:clrMapOvr>
+  <p:timing>
+    <p:tnLst>
+      <p:par>
+        <p:cTn id="1" dur="indefinite" restart="never" nodeType="tmRoot"/>
+      </p:par>
+    </p:tnLst>
+  </p:timing>
+</p:sld>
+</file>
+
+<file path=ppt/slides/slide23.xml><?xml version="1.0" encoding="utf-8"?>
+<p:sld xmlns:a="http://schemas.openxmlformats.org/drawingml/2006/main" xmlns:r="http://schemas.openxmlformats.org/officeDocument/2006/relationships" xmlns:p="http://schemas.openxmlformats.org/presentationml/2006/main">
+  <p:cSld>
+    <p:spTree>
+      <p:nvGrpSpPr>
+        <p:cNvPr id="1" name=""/>
+        <p:cNvGrpSpPr/>
+        <p:nvPr/>
+      </p:nvGrpSpPr>
+      <p:grpSpPr>
+        <a:xfrm>
+          <a:off x="0" y="0"/>
+          <a:ext cx="0" cy="0"/>
+          <a:chOff x="0" y="0"/>
+          <a:chExt cx="0" cy="0"/>
+        </a:xfrm>
+      </p:grpSpPr>
+      <p:sp>
+        <p:nvSpPr>
           <p:cNvPr id="4" name="Title 3"/>
           <p:cNvSpPr>
             <a:spLocks noGrp="1"/>
@@ -14330,15 +14566,7 @@
                 <a:cs typeface="Arial" panose="020B0604020202020204" pitchFamily="34" charset="0"/>
                 <a:hlinkClick r:id="rId2"/>
               </a:rPr>
-              <a:t>https://</a:t>
-            </a:r>
-            <a:r>
-              <a:rPr lang="sr-Latn-BA" sz="1400" dirty="0" smtClean="0">
-                <a:latin typeface="Arial" panose="020B0604020202020204" pitchFamily="34" charset="0"/>
-                <a:cs typeface="Arial" panose="020B0604020202020204" pitchFamily="34" charset="0"/>
-                <a:hlinkClick r:id="rId2"/>
-              </a:rPr>
-              <a:t>miroslavpopovic.com</a:t>
+              <a:t>https://miroslavpopovic.com</a:t>
             </a:r>
             <a:endParaRPr lang="sr-Latn-BA" sz="1400" dirty="0" smtClean="0">
               <a:latin typeface="Arial" panose="020B0604020202020204" pitchFamily="34" charset="0"/>
@@ -14726,8 +14954,8 @@
         </p:blipFill>
         <p:spPr bwMode="auto">
           <a:xfrm>
-            <a:off x="4190229" y="2157461"/>
-            <a:ext cx="3811541" cy="3687666"/>
+            <a:off x="3746091" y="1027906"/>
+            <a:ext cx="5179912" cy="5011565"/>
           </a:xfrm>
           <a:prstGeom prst="rect">
             <a:avLst/>

</xml_diff>